<commit_message>
Add Salt mechanism and move some file.
</commit_message>
<xml_diff>
--- a/密碼學期末專題簡報.pptx
+++ b/密碼學期末專題簡報.pptx
@@ -132,7 +132,7 @@
   </p:defaultTextStyle>
   <p:extLst>
     <p:ext uri="{EFAFB233-063F-42B5-8137-9DF3F51BA10A}">
-      <p15:sldGuideLst xmlns:p15="http://schemas.microsoft.com/office/powerpoint/2012/main" xmlns="">
+      <p15:sldGuideLst xmlns="" xmlns:p15="http://schemas.microsoft.com/office/powerpoint/2012/main">
         <p15:guide id="1" orient="horz" pos="2160">
           <p15:clr>
             <a:srgbClr val="A4A3A4"/>
@@ -161,7 +161,7 @@
       </p15:sldGuideLst>
     </p:ext>
     <p:ext uri="{2D200454-40CA-4A62-9FC3-DE9A4176ACB9}">
-      <p15:notesGuideLst xmlns:p15="http://schemas.microsoft.com/office/powerpoint/2012/main" xmlns="">
+      <p15:notesGuideLst xmlns="" xmlns:p15="http://schemas.microsoft.com/office/powerpoint/2012/main">
         <p15:guide id="1" orient="horz" pos="2880">
           <p15:clr>
             <a:srgbClr val="A4A3A4"/>
@@ -268,7 +268,7 @@
                 <a:latin typeface="Microsoft JhengHei UI" panose="020B0604030504040204" pitchFamily="34" charset="-120"/>
                 <a:ea typeface="Microsoft JhengHei UI" panose="020B0604030504040204" pitchFamily="34" charset="-120"/>
               </a:rPr>
-              <a:t>2025/5/22</a:t>
+              <a:t>2025/5/23</a:t>
             </a:fld>
             <a:endParaRPr lang="zh-TW" altLang="en-US">
               <a:latin typeface="Microsoft JhengHei UI" panose="020B0604030504040204" pitchFamily="34" charset="-120"/>
@@ -454,7 +454,7 @@
           <a:p>
             <a:fld id="{B0A587AB-C785-4ECC-B9BB-3D529D1F06DC}" type="datetime1">
               <a:rPr lang="zh-TW" altLang="en-US" noProof="0" smtClean="0"/>
-              <a:t>2025/5/22</a:t>
+              <a:t>2025/5/23</a:t>
             </a:fld>
             <a:endParaRPr lang="zh-TW" altLang="en-US" noProof="0" dirty="0"/>
           </a:p>
@@ -2890,7 +2890,7 @@
           <a:p>
             <a:fld id="{7025A1CD-099F-4E6B-845B-76AC65CEDBE7}" type="datetime1">
               <a:rPr lang="zh-TW" altLang="en-US" noProof="0" smtClean="0"/>
-              <a:t>2025/5/22</a:t>
+              <a:t>2025/5/23</a:t>
             </a:fld>
             <a:endParaRPr lang="zh-TW" altLang="en-US" noProof="0"/>
           </a:p>
@@ -2937,7 +2937,7 @@
           <p:cNvPr id="17" name="Picture 2" descr="國立臺灣大學">
             <a:extLst>
               <a:ext uri="{FF2B5EF4-FFF2-40B4-BE49-F238E27FC236}">
-                <a16:creationId xmlns:a16="http://schemas.microsoft.com/office/drawing/2014/main" xmlns="" id="{84C36C24-3B92-4925-8868-E617BA10AC38}"/>
+                <a16:creationId xmlns="" xmlns:a16="http://schemas.microsoft.com/office/drawing/2014/main" id="{84C36C24-3B92-4925-8868-E617BA10AC38}"/>
               </a:ext>
             </a:extLst>
           </p:cNvPr>
@@ -3314,7 +3314,7 @@
           <a:p>
             <a:fld id="{8A66919C-2879-4964-ADA5-05BE97665E98}" type="datetime1">
               <a:rPr lang="zh-TW" altLang="en-US" noProof="0" smtClean="0"/>
-              <a:t>2025/5/22</a:t>
+              <a:t>2025/5/23</a:t>
             </a:fld>
             <a:endParaRPr lang="zh-TW" altLang="en-US" noProof="0"/>
           </a:p>
@@ -3570,7 +3570,7 @@
           <a:p>
             <a:fld id="{C9FD95EC-10DD-4475-A030-8C9B84211375}" type="datetime1">
               <a:rPr lang="zh-TW" altLang="en-US" noProof="0" smtClean="0"/>
-              <a:t>2025/5/22</a:t>
+              <a:t>2025/5/23</a:t>
             </a:fld>
             <a:endParaRPr lang="zh-TW" altLang="en-US" noProof="0"/>
           </a:p>
@@ -3836,7 +3836,7 @@
           <a:p>
             <a:fld id="{FD4B027F-A9C0-4F33-A679-F17E60001344}" type="datetime1">
               <a:rPr lang="zh-TW" altLang="en-US" noProof="0" smtClean="0"/>
-              <a:t>2025/5/22</a:t>
+              <a:t>2025/5/23</a:t>
             </a:fld>
             <a:endParaRPr lang="zh-TW" altLang="en-US" noProof="0"/>
           </a:p>
@@ -4082,7 +4082,7 @@
           <a:p>
             <a:fld id="{EF3A231D-725F-43B6-A03C-0D1B80D07BE1}" type="datetime1">
               <a:rPr lang="zh-TW" altLang="en-US" noProof="0" smtClean="0"/>
-              <a:t>2025/5/22</a:t>
+              <a:t>2025/5/23</a:t>
             </a:fld>
             <a:endParaRPr lang="zh-TW" altLang="en-US" noProof="0"/>
           </a:p>
@@ -4338,7 +4338,7 @@
           <a:p>
             <a:fld id="{A1C8904F-070E-49CB-AD43-64EDE507F9B7}" type="datetime1">
               <a:rPr lang="zh-TW" altLang="en-US" noProof="0" smtClean="0"/>
-              <a:t>2025/5/22</a:t>
+              <a:t>2025/5/23</a:t>
             </a:fld>
             <a:endParaRPr lang="zh-TW" altLang="en-US" noProof="0"/>
           </a:p>
@@ -4491,7 +4491,7 @@
           <a:p>
             <a:fld id="{1A4D21C7-088F-4C14-AA88-F5DDEF7465A6}" type="datetime1">
               <a:rPr lang="zh-TW" altLang="en-US" noProof="0" smtClean="0"/>
-              <a:t>2025/5/22</a:t>
+              <a:t>2025/5/23</a:t>
             </a:fld>
             <a:endParaRPr lang="zh-TW" altLang="en-US" noProof="0"/>
           </a:p>
@@ -4536,7 +4536,7 @@
           <p:cNvPr id="2050" name="Picture 2" descr="台大遴選會決定遭駁回管中閔不是校長了，台灣學到什麼教訓？｜天下雜誌">
             <a:extLst>
               <a:ext uri="{FF2B5EF4-FFF2-40B4-BE49-F238E27FC236}">
-                <a16:creationId xmlns:a16="http://schemas.microsoft.com/office/drawing/2014/main" xmlns="" id="{AD25CCFA-A169-4B4D-9AAB-4FD3CE0117D8}"/>
+                <a16:creationId xmlns="" xmlns:a16="http://schemas.microsoft.com/office/drawing/2014/main" id="{AD25CCFA-A169-4B4D-9AAB-4FD3CE0117D8}"/>
               </a:ext>
             </a:extLst>
           </p:cNvPr>
@@ -4575,7 +4575,7 @@
           <p:cNvPr id="9" name="標題 1">
             <a:extLst>
               <a:ext uri="{FF2B5EF4-FFF2-40B4-BE49-F238E27FC236}">
-                <a16:creationId xmlns:a16="http://schemas.microsoft.com/office/drawing/2014/main" xmlns="" id="{BDFD2411-5069-4CA5-B66E-AB62E7A1DE60}"/>
+                <a16:creationId xmlns="" xmlns:a16="http://schemas.microsoft.com/office/drawing/2014/main" id="{BDFD2411-5069-4CA5-B66E-AB62E7A1DE60}"/>
               </a:ext>
             </a:extLst>
           </p:cNvPr>
@@ -4618,7 +4618,7 @@
           <p:cNvPr id="10" name="內容預留位置 2">
             <a:extLst>
               <a:ext uri="{FF2B5EF4-FFF2-40B4-BE49-F238E27FC236}">
-                <a16:creationId xmlns:a16="http://schemas.microsoft.com/office/drawing/2014/main" xmlns="" id="{BDA314B9-2928-4296-A8F2-C460B7717FDB}"/>
+                <a16:creationId xmlns="" xmlns:a16="http://schemas.microsoft.com/office/drawing/2014/main" id="{BDA314B9-2928-4296-A8F2-C460B7717FDB}"/>
               </a:ext>
             </a:extLst>
           </p:cNvPr>
@@ -4812,7 +4812,7 @@
           <a:p>
             <a:fld id="{07AFF883-2F10-4A07-ABF7-3E7D71A2862B}" type="datetime1">
               <a:rPr lang="zh-TW" altLang="en-US" noProof="0" smtClean="0"/>
-              <a:t>2025/5/22</a:t>
+              <a:t>2025/5/23</a:t>
             </a:fld>
             <a:endParaRPr lang="zh-TW" altLang="en-US" noProof="0"/>
           </a:p>
@@ -4857,7 +4857,7 @@
           <p:cNvPr id="2" name="箭號: 五邊形 1">
             <a:extLst>
               <a:ext uri="{FF2B5EF4-FFF2-40B4-BE49-F238E27FC236}">
-                <a16:creationId xmlns:a16="http://schemas.microsoft.com/office/drawing/2014/main" xmlns="" id="{2B2A4164-FC51-40C1-8307-BD11C0F8CFB5}"/>
+                <a16:creationId xmlns="" xmlns:a16="http://schemas.microsoft.com/office/drawing/2014/main" id="{2B2A4164-FC51-40C1-8307-BD11C0F8CFB5}"/>
               </a:ext>
             </a:extLst>
           </p:cNvPr>
@@ -4914,7 +4914,7 @@
           <p:cNvPr id="8" name="箭號: 五邊形 7">
             <a:extLst>
               <a:ext uri="{FF2B5EF4-FFF2-40B4-BE49-F238E27FC236}">
-                <a16:creationId xmlns:a16="http://schemas.microsoft.com/office/drawing/2014/main" xmlns="" id="{A42C3E17-FE95-45A4-BE55-35C930896E44}"/>
+                <a16:creationId xmlns="" xmlns:a16="http://schemas.microsoft.com/office/drawing/2014/main" id="{A42C3E17-FE95-45A4-BE55-35C930896E44}"/>
               </a:ext>
             </a:extLst>
           </p:cNvPr>
@@ -4971,7 +4971,7 @@
           <p:cNvPr id="9" name="Picture 2" descr="國立臺灣大學">
             <a:extLst>
               <a:ext uri="{FF2B5EF4-FFF2-40B4-BE49-F238E27FC236}">
-                <a16:creationId xmlns:a16="http://schemas.microsoft.com/office/drawing/2014/main" xmlns="" id="{2E88D82B-E998-4EDD-80FE-2F0EDEAEB0EB}"/>
+                <a16:creationId xmlns="" xmlns:a16="http://schemas.microsoft.com/office/drawing/2014/main" id="{2E88D82B-E998-4EDD-80FE-2F0EDEAEB0EB}"/>
               </a:ext>
             </a:extLst>
           </p:cNvPr>
@@ -5018,7 +5018,7 @@
           <p:cNvPr id="10" name="標題 1">
             <a:extLst>
               <a:ext uri="{FF2B5EF4-FFF2-40B4-BE49-F238E27FC236}">
-                <a16:creationId xmlns:a16="http://schemas.microsoft.com/office/drawing/2014/main" xmlns="" id="{93ABB2D6-1831-4B6F-8B8F-924BF377F7F3}"/>
+                <a16:creationId xmlns="" xmlns:a16="http://schemas.microsoft.com/office/drawing/2014/main" id="{93ABB2D6-1831-4B6F-8B8F-924BF377F7F3}"/>
               </a:ext>
             </a:extLst>
           </p:cNvPr>
@@ -5064,7 +5064,7 @@
           <p:cNvPr id="11" name="內容預留位置 2">
             <a:extLst>
               <a:ext uri="{FF2B5EF4-FFF2-40B4-BE49-F238E27FC236}">
-                <a16:creationId xmlns:a16="http://schemas.microsoft.com/office/drawing/2014/main" xmlns="" id="{802C1E61-2E34-4316-8FE7-FDF47C3C8932}"/>
+                <a16:creationId xmlns="" xmlns:a16="http://schemas.microsoft.com/office/drawing/2014/main" id="{802C1E61-2E34-4316-8FE7-FDF47C3C8932}"/>
               </a:ext>
             </a:extLst>
           </p:cNvPr>
@@ -5516,7 +5516,7 @@
           <a:p>
             <a:fld id="{492DEF5F-C38C-430A-A0DE-47FE9CE7FE7F}" type="datetime1">
               <a:rPr lang="zh-TW" altLang="en-US" noProof="0" smtClean="0"/>
-              <a:t>2025/5/22</a:t>
+              <a:t>2025/5/23</a:t>
             </a:fld>
             <a:endParaRPr lang="zh-TW" altLang="en-US" noProof="0"/>
           </a:p>
@@ -6026,7 +6026,7 @@
           <a:p>
             <a:fld id="{FB53CE18-37B0-4354-95BA-F6E2958D7E39}" type="datetime1">
               <a:rPr lang="zh-TW" altLang="en-US" noProof="0" smtClean="0"/>
-              <a:t>2025/5/22</a:t>
+              <a:t>2025/5/23</a:t>
             </a:fld>
             <a:endParaRPr lang="zh-TW" altLang="en-US" noProof="0"/>
           </a:p>
@@ -6188,7 +6188,7 @@
           <a:p>
             <a:fld id="{840D92E5-0E9E-447B-AB12-50B31DB78792}" type="datetime1">
               <a:rPr lang="zh-TW" altLang="en-US" noProof="0" smtClean="0"/>
-              <a:t>2025/5/22</a:t>
+              <a:t>2025/5/23</a:t>
             </a:fld>
             <a:endParaRPr lang="zh-TW" altLang="en-US" noProof="0"/>
           </a:p>
@@ -6479,7 +6479,7 @@
           <a:p>
             <a:fld id="{2DBDA392-58F4-49D0-A77B-A750F0E30EC9}" type="datetime1">
               <a:rPr lang="zh-TW" altLang="en-US" noProof="0" smtClean="0"/>
-              <a:t>2025/5/22</a:t>
+              <a:t>2025/5/23</a:t>
             </a:fld>
             <a:endParaRPr lang="zh-TW" altLang="en-US" noProof="0"/>
           </a:p>
@@ -6874,7 +6874,7 @@
           <a:p>
             <a:fld id="{6ADA41C7-C7E8-4EC2-8EC0-5E7AFDF89795}" type="datetime1">
               <a:rPr lang="zh-TW" altLang="en-US" noProof="0" smtClean="0"/>
-              <a:t>2025/5/22</a:t>
+              <a:t>2025/5/23</a:t>
             </a:fld>
             <a:endParaRPr lang="zh-TW" altLang="en-US" noProof="0"/>
           </a:p>
@@ -7448,7 +7448,7 @@
           <a:p>
             <a:fld id="{F1139FD8-5407-4A67-A886-B56A7B50E975}" type="datetime1">
               <a:rPr lang="zh-TW" altLang="en-US" noProof="0" smtClean="0"/>
-              <a:t>2025/5/22</a:t>
+              <a:t>2025/5/23</a:t>
             </a:fld>
             <a:endParaRPr lang="zh-TW" altLang="en-US" noProof="0"/>
           </a:p>
@@ -8255,7 +8255,7 @@
           <p:cNvPr id="19" name="標題 1">
             <a:extLst>
               <a:ext uri="{FF2B5EF4-FFF2-40B4-BE49-F238E27FC236}">
-                <a16:creationId xmlns:a16="http://schemas.microsoft.com/office/drawing/2014/main" xmlns="" id="{50E9A64D-4207-4980-8736-4201C3E0DC63}"/>
+                <a16:creationId xmlns="" xmlns:a16="http://schemas.microsoft.com/office/drawing/2014/main" id="{50E9A64D-4207-4980-8736-4201C3E0DC63}"/>
               </a:ext>
             </a:extLst>
           </p:cNvPr>
@@ -8331,7 +8331,7 @@
           <p:cNvPr id="24" name="內容版面配置區 2">
             <a:extLst>
               <a:ext uri="{FF2B5EF4-FFF2-40B4-BE49-F238E27FC236}">
-                <a16:creationId xmlns:a16="http://schemas.microsoft.com/office/drawing/2014/main" xmlns="" id="{F5C22ADD-7A5D-44F8-969C-F4721C016703}"/>
+                <a16:creationId xmlns="" xmlns:a16="http://schemas.microsoft.com/office/drawing/2014/main" id="{F5C22ADD-7A5D-44F8-969C-F4721C016703}"/>
               </a:ext>
             </a:extLst>
           </p:cNvPr>
@@ -8822,7 +8822,7 @@
               <p:cNvPr id="10" name="內容版面配置區 2">
                 <a:extLst>
                   <a:ext uri="{FF2B5EF4-FFF2-40B4-BE49-F238E27FC236}">
-                    <a16:creationId xmlns:a16="http://schemas.microsoft.com/office/drawing/2014/main" xmlns="" id="{2E881D55-3B47-403F-8F0E-EDFDE34A1B22}"/>
+                    <a16:creationId xmlns="" xmlns:a16="http://schemas.microsoft.com/office/drawing/2014/main" id="{2E881D55-3B47-403F-8F0E-EDFDE34A1B22}"/>
                   </a:ext>
                 </a:extLst>
               </p:cNvPr>
@@ -9056,7 +9056,7 @@
           <p:cNvPr id="19" name="標題 1">
             <a:extLst>
               <a:ext uri="{FF2B5EF4-FFF2-40B4-BE49-F238E27FC236}">
-                <a16:creationId xmlns:a16="http://schemas.microsoft.com/office/drawing/2014/main" xmlns="" id="{50E9A64D-4207-4980-8736-4201C3E0DC63}"/>
+                <a16:creationId xmlns="" xmlns:a16="http://schemas.microsoft.com/office/drawing/2014/main" id="{50E9A64D-4207-4980-8736-4201C3E0DC63}"/>
               </a:ext>
             </a:extLst>
           </p:cNvPr>
@@ -9132,7 +9132,7 @@
           <p:cNvPr id="24" name="內容版面配置區 2">
             <a:extLst>
               <a:ext uri="{FF2B5EF4-FFF2-40B4-BE49-F238E27FC236}">
-                <a16:creationId xmlns:a16="http://schemas.microsoft.com/office/drawing/2014/main" xmlns="" id="{F5C22ADD-7A5D-44F8-969C-F4721C016703}"/>
+                <a16:creationId xmlns="" xmlns:a16="http://schemas.microsoft.com/office/drawing/2014/main" id="{F5C22ADD-7A5D-44F8-969C-F4721C016703}"/>
               </a:ext>
             </a:extLst>
           </p:cNvPr>
@@ -9602,7 +9602,7 @@
           <p:cNvPr id="24" name="內容版面配置區 2">
             <a:extLst>
               <a:ext uri="{FF2B5EF4-FFF2-40B4-BE49-F238E27FC236}">
-                <a16:creationId xmlns:a16="http://schemas.microsoft.com/office/drawing/2014/main" xmlns="" id="{F5C22ADD-7A5D-44F8-969C-F4721C016703}"/>
+                <a16:creationId xmlns="" xmlns:a16="http://schemas.microsoft.com/office/drawing/2014/main" id="{F5C22ADD-7A5D-44F8-969C-F4721C016703}"/>
               </a:ext>
             </a:extLst>
           </p:cNvPr>
@@ -9866,19 +9866,7 @@
                 <a:latin typeface="微軟正黑體" panose="020B0604030504040204" pitchFamily="34" charset="-120"/>
                 <a:ea typeface="微軟正黑體" panose="020B0604030504040204" pitchFamily="34" charset="-120"/>
               </a:rPr>
-              <a:t> </a:t>
-            </a:r>
-            <a:r>
-              <a:rPr lang="en-US" altLang="zh-TW" sz="2800" b="1" dirty="0" smtClean="0">
-                <a:solidFill>
-                  <a:schemeClr val="accent1">
-                    <a:lumMod val="75000"/>
-                  </a:schemeClr>
-                </a:solidFill>
-                <a:latin typeface="微軟正黑體" panose="020B0604030504040204" pitchFamily="34" charset="-120"/>
-                <a:ea typeface="微軟正黑體" panose="020B0604030504040204" pitchFamily="34" charset="-120"/>
-              </a:rPr>
-              <a:t>Protocol </a:t>
+              <a:t> Protocol </a:t>
             </a:r>
             <a:r>
               <a:rPr lang="en-US" altLang="zh-TW" sz="2800" b="1" dirty="0" smtClean="0">
@@ -9921,14 +9909,14 @@
           </a:p>
         </p:txBody>
       </p:sp>
-      <mc:AlternateContent xmlns:mc="http://schemas.openxmlformats.org/markup-compatibility/2006">
-        <mc:Choice xmlns:a14="http://schemas.microsoft.com/office/drawing/2010/main" Requires="a14">
+      <mc:AlternateContent xmlns:mc="http://schemas.openxmlformats.org/markup-compatibility/2006" xmlns:a14="http://schemas.microsoft.com/office/drawing/2010/main">
+        <mc:Choice Requires="a14">
           <p:sp>
             <p:nvSpPr>
               <p:cNvPr id="10" name="內容版面配置區 2">
                 <a:extLst>
                   <a:ext uri="{FF2B5EF4-FFF2-40B4-BE49-F238E27FC236}">
-                    <a16:creationId xmlns:a16="http://schemas.microsoft.com/office/drawing/2014/main" xmlns="" id="{2E881D55-3B47-403F-8F0E-EDFDE34A1B22}"/>
+                    <a16:creationId xmlns="" xmlns:a16="http://schemas.microsoft.com/office/drawing/2014/main" id="{2E881D55-3B47-403F-8F0E-EDFDE34A1B22}"/>
                   </a:ext>
                 </a:extLst>
               </p:cNvPr>
@@ -10578,7 +10566,7 @@
             </p:txBody>
           </p:sp>
         </mc:Choice>
-        <mc:Fallback>
+        <mc:Fallback xmlns="">
           <p:sp>
             <p:nvSpPr>
               <p:cNvPr id="10" name="內容版面配置區 2">
@@ -10651,7 +10639,7 @@
           <p:cNvPr id="19" name="標題 1">
             <a:extLst>
               <a:ext uri="{FF2B5EF4-FFF2-40B4-BE49-F238E27FC236}">
-                <a16:creationId xmlns:a16="http://schemas.microsoft.com/office/drawing/2014/main" xmlns="" id="{50E9A64D-4207-4980-8736-4201C3E0DC63}"/>
+                <a16:creationId xmlns="" xmlns:a16="http://schemas.microsoft.com/office/drawing/2014/main" id="{50E9A64D-4207-4980-8736-4201C3E0DC63}"/>
               </a:ext>
             </a:extLst>
           </p:cNvPr>
@@ -10800,7 +10788,7 @@
           <p:cNvPr id="19" name="標題 1">
             <a:extLst>
               <a:ext uri="{FF2B5EF4-FFF2-40B4-BE49-F238E27FC236}">
-                <a16:creationId xmlns:a16="http://schemas.microsoft.com/office/drawing/2014/main" xmlns="" id="{50E9A64D-4207-4980-8736-4201C3E0DC63}"/>
+                <a16:creationId xmlns="" xmlns:a16="http://schemas.microsoft.com/office/drawing/2014/main" id="{50E9A64D-4207-4980-8736-4201C3E0DC63}"/>
               </a:ext>
             </a:extLst>
           </p:cNvPr>
@@ -10876,7 +10864,7 @@
           <p:cNvPr id="24" name="內容版面配置區 2">
             <a:extLst>
               <a:ext uri="{FF2B5EF4-FFF2-40B4-BE49-F238E27FC236}">
-                <a16:creationId xmlns:a16="http://schemas.microsoft.com/office/drawing/2014/main" xmlns="" id="{F5C22ADD-7A5D-44F8-969C-F4721C016703}"/>
+                <a16:creationId xmlns="" xmlns:a16="http://schemas.microsoft.com/office/drawing/2014/main" id="{F5C22ADD-7A5D-44F8-969C-F4721C016703}"/>
               </a:ext>
             </a:extLst>
           </p:cNvPr>
@@ -11140,19 +11128,7 @@
                 <a:latin typeface="微軟正黑體" panose="020B0604030504040204" pitchFamily="34" charset="-120"/>
                 <a:ea typeface="微軟正黑體" panose="020B0604030504040204" pitchFamily="34" charset="-120"/>
               </a:rPr>
-              <a:t> </a:t>
-            </a:r>
-            <a:r>
-              <a:rPr lang="en-US" altLang="zh-TW" sz="2800" b="1" dirty="0" smtClean="0">
-                <a:solidFill>
-                  <a:schemeClr val="accent1">
-                    <a:lumMod val="75000"/>
-                  </a:schemeClr>
-                </a:solidFill>
-                <a:latin typeface="微軟正黑體" panose="020B0604030504040204" pitchFamily="34" charset="-120"/>
-                <a:ea typeface="微軟正黑體" panose="020B0604030504040204" pitchFamily="34" charset="-120"/>
-              </a:rPr>
-              <a:t>Protocol </a:t>
+              <a:t> Protocol </a:t>
             </a:r>
             <a:r>
               <a:rPr lang="en-US" altLang="zh-TW" sz="2800" b="1" dirty="0" smtClean="0">
@@ -11251,7 +11227,7 @@
       </p:pic>
       <p:pic>
         <p:nvPicPr>
-          <p:cNvPr id="8" name="圖片 7"/>
+          <p:cNvPr id="7" name="圖片 6"/>
           <p:cNvPicPr/>
           <p:nvPr/>
         </p:nvPicPr>
@@ -11263,8 +11239,8 @@
         </p:blipFill>
         <p:spPr>
           <a:xfrm>
-            <a:off x="403152" y="1624382"/>
-            <a:ext cx="5835276" cy="4612930"/>
+            <a:off x="405780" y="1628800"/>
+            <a:ext cx="5832648" cy="4680520"/>
           </a:xfrm>
           <a:prstGeom prst="rect">
             <a:avLst/>
@@ -11349,7 +11325,7 @@
           <p:cNvPr id="19" name="標題 1">
             <a:extLst>
               <a:ext uri="{FF2B5EF4-FFF2-40B4-BE49-F238E27FC236}">
-                <a16:creationId xmlns:a16="http://schemas.microsoft.com/office/drawing/2014/main" xmlns="" id="{50E9A64D-4207-4980-8736-4201C3E0DC63}"/>
+                <a16:creationId xmlns="" xmlns:a16="http://schemas.microsoft.com/office/drawing/2014/main" id="{50E9A64D-4207-4980-8736-4201C3E0DC63}"/>
               </a:ext>
             </a:extLst>
           </p:cNvPr>
@@ -11425,7 +11401,7 @@
           <p:cNvPr id="24" name="內容版面配置區 2">
             <a:extLst>
               <a:ext uri="{FF2B5EF4-FFF2-40B4-BE49-F238E27FC236}">
-                <a16:creationId xmlns:a16="http://schemas.microsoft.com/office/drawing/2014/main" xmlns="" id="{F5C22ADD-7A5D-44F8-969C-F4721C016703}"/>
+                <a16:creationId xmlns="" xmlns:a16="http://schemas.microsoft.com/office/drawing/2014/main" id="{F5C22ADD-7A5D-44F8-969C-F4721C016703}"/>
               </a:ext>
             </a:extLst>
           </p:cNvPr>
@@ -11689,19 +11665,7 @@
                 <a:latin typeface="微軟正黑體" panose="020B0604030504040204" pitchFamily="34" charset="-120"/>
                 <a:ea typeface="微軟正黑體" panose="020B0604030504040204" pitchFamily="34" charset="-120"/>
               </a:rPr>
-              <a:t> </a:t>
-            </a:r>
-            <a:r>
-              <a:rPr lang="en-US" altLang="zh-TW" sz="2800" b="1" dirty="0" smtClean="0">
-                <a:solidFill>
-                  <a:schemeClr val="accent1">
-                    <a:lumMod val="75000"/>
-                  </a:schemeClr>
-                </a:solidFill>
-                <a:latin typeface="微軟正黑體" panose="020B0604030504040204" pitchFamily="34" charset="-120"/>
-                <a:ea typeface="微軟正黑體" panose="020B0604030504040204" pitchFamily="34" charset="-120"/>
-              </a:rPr>
-              <a:t>Protocol </a:t>
+              <a:t> Protocol </a:t>
             </a:r>
             <a:r>
               <a:rPr lang="en-US" altLang="zh-TW" sz="2800" b="1" dirty="0" smtClean="0">
@@ -11791,7 +11755,7 @@
       </p:sp>
       <p:pic>
         <p:nvPicPr>
-          <p:cNvPr id="1026" name="Picture 2"/>
+          <p:cNvPr id="3" name="Picture 2"/>
           <p:cNvPicPr>
             <a:picLocks noChangeAspect="1" noChangeArrowheads="1"/>
           </p:cNvPicPr>
@@ -11812,8 +11776,8 @@
         </p:blipFill>
         <p:spPr bwMode="auto">
           <a:xfrm>
-            <a:off x="2854052" y="1806699"/>
-            <a:ext cx="6038850" cy="1838325"/>
+            <a:off x="2923253" y="1645356"/>
+            <a:ext cx="6057900" cy="1828800"/>
           </a:xfrm>
           <a:prstGeom prst="rect">
             <a:avLst/>
@@ -11845,7 +11809,7 @@
       </p:pic>
       <p:pic>
         <p:nvPicPr>
-          <p:cNvPr id="1028" name="Picture 4"/>
+          <p:cNvPr id="1027" name="Picture 3"/>
           <p:cNvPicPr>
             <a:picLocks noChangeAspect="1" noChangeArrowheads="1"/>
           </p:cNvPicPr>
@@ -11866,8 +11830,8 @@
         </p:blipFill>
         <p:spPr bwMode="auto">
           <a:xfrm>
-            <a:off x="2931690" y="4511888"/>
-            <a:ext cx="6115050" cy="1562100"/>
+            <a:off x="2854052" y="4555286"/>
+            <a:ext cx="6334125" cy="1543050"/>
           </a:xfrm>
           <a:prstGeom prst="rect">
             <a:avLst/>
@@ -11951,7 +11915,7 @@
           <p:cNvPr id="24" name="內容版面配置區 2">
             <a:extLst>
               <a:ext uri="{FF2B5EF4-FFF2-40B4-BE49-F238E27FC236}">
-                <a16:creationId xmlns:a16="http://schemas.microsoft.com/office/drawing/2014/main" xmlns="" id="{F5C22ADD-7A5D-44F8-969C-F4721C016703}"/>
+                <a16:creationId xmlns="" xmlns:a16="http://schemas.microsoft.com/office/drawing/2014/main" id="{F5C22ADD-7A5D-44F8-969C-F4721C016703}"/>
               </a:ext>
             </a:extLst>
           </p:cNvPr>
@@ -12291,7 +12255,7 @@
           <p:cNvPr id="10" name="內容版面配置區 2">
             <a:extLst>
               <a:ext uri="{FF2B5EF4-FFF2-40B4-BE49-F238E27FC236}">
-                <a16:creationId xmlns:a16="http://schemas.microsoft.com/office/drawing/2014/main" xmlns="" id="{2E881D55-3B47-403F-8F0E-EDFDE34A1B22}"/>
+                <a16:creationId xmlns="" xmlns:a16="http://schemas.microsoft.com/office/drawing/2014/main" id="{2E881D55-3B47-403F-8F0E-EDFDE34A1B22}"/>
               </a:ext>
             </a:extLst>
           </p:cNvPr>
@@ -12402,7 +12366,7 @@
           <p:cNvPr id="19" name="標題 1">
             <a:extLst>
               <a:ext uri="{FF2B5EF4-FFF2-40B4-BE49-F238E27FC236}">
-                <a16:creationId xmlns:a16="http://schemas.microsoft.com/office/drawing/2014/main" xmlns="" id="{50E9A64D-4207-4980-8736-4201C3E0DC63}"/>
+                <a16:creationId xmlns="" xmlns:a16="http://schemas.microsoft.com/office/drawing/2014/main" id="{50E9A64D-4207-4980-8736-4201C3E0DC63}"/>
               </a:ext>
             </a:extLst>
           </p:cNvPr>
@@ -12527,7 +12491,7 @@
           <p:cNvPr id="3" name="標題 2">
             <a:extLst>
               <a:ext uri="{FF2B5EF4-FFF2-40B4-BE49-F238E27FC236}">
-                <a16:creationId xmlns:a16="http://schemas.microsoft.com/office/drawing/2014/main" xmlns="" id="{4ABAB1B2-9811-49A5-968D-AA6F881D5BFC}"/>
+                <a16:creationId xmlns="" xmlns:a16="http://schemas.microsoft.com/office/drawing/2014/main" id="{4ABAB1B2-9811-49A5-968D-AA6F881D5BFC}"/>
               </a:ext>
             </a:extLst>
           </p:cNvPr>
@@ -12608,7 +12572,7 @@
           <p:cNvPr id="4" name="內容版面配置區 3">
             <a:extLst>
               <a:ext uri="{FF2B5EF4-FFF2-40B4-BE49-F238E27FC236}">
-                <a16:creationId xmlns:a16="http://schemas.microsoft.com/office/drawing/2014/main" xmlns="" id="{FCCA5DD9-09D4-479C-9F96-62D1622C7DB1}"/>
+                <a16:creationId xmlns="" xmlns:a16="http://schemas.microsoft.com/office/drawing/2014/main" id="{FCCA5DD9-09D4-479C-9F96-62D1622C7DB1}"/>
               </a:ext>
             </a:extLst>
           </p:cNvPr>
@@ -12784,7 +12748,7 @@
           <p:cNvPr id="19" name="標題 1">
             <a:extLst>
               <a:ext uri="{FF2B5EF4-FFF2-40B4-BE49-F238E27FC236}">
-                <a16:creationId xmlns:a16="http://schemas.microsoft.com/office/drawing/2014/main" xmlns="" id="{50E9A64D-4207-4980-8736-4201C3E0DC63}"/>
+                <a16:creationId xmlns="" xmlns:a16="http://schemas.microsoft.com/office/drawing/2014/main" id="{50E9A64D-4207-4980-8736-4201C3E0DC63}"/>
               </a:ext>
             </a:extLst>
           </p:cNvPr>
@@ -12832,7 +12796,7 @@
           <p:cNvPr id="24" name="內容版面配置區 2">
             <a:extLst>
               <a:ext uri="{FF2B5EF4-FFF2-40B4-BE49-F238E27FC236}">
-                <a16:creationId xmlns:a16="http://schemas.microsoft.com/office/drawing/2014/main" xmlns="" id="{F5C22ADD-7A5D-44F8-969C-F4721C016703}"/>
+                <a16:creationId xmlns="" xmlns:a16="http://schemas.microsoft.com/office/drawing/2014/main" id="{F5C22ADD-7A5D-44F8-969C-F4721C016703}"/>
               </a:ext>
             </a:extLst>
           </p:cNvPr>
@@ -13104,7 +13068,7 @@
           <p:cNvPr id="20" name="內容版面配置區 2">
             <a:extLst>
               <a:ext uri="{FF2B5EF4-FFF2-40B4-BE49-F238E27FC236}">
-                <a16:creationId xmlns:a16="http://schemas.microsoft.com/office/drawing/2014/main" xmlns="" id="{2E881D55-3B47-403F-8F0E-EDFDE34A1B22}"/>
+                <a16:creationId xmlns="" xmlns:a16="http://schemas.microsoft.com/office/drawing/2014/main" id="{2E881D55-3B47-403F-8F0E-EDFDE34A1B22}"/>
               </a:ext>
             </a:extLst>
           </p:cNvPr>
@@ -13217,7 +13181,7 @@
           <p:cNvPr id="3" name="標題 2">
             <a:extLst>
               <a:ext uri="{FF2B5EF4-FFF2-40B4-BE49-F238E27FC236}">
-                <a16:creationId xmlns:a16="http://schemas.microsoft.com/office/drawing/2014/main" xmlns="" id="{4ABAB1B2-9811-49A5-968D-AA6F881D5BFC}"/>
+                <a16:creationId xmlns="" xmlns:a16="http://schemas.microsoft.com/office/drawing/2014/main" id="{4ABAB1B2-9811-49A5-968D-AA6F881D5BFC}"/>
               </a:ext>
             </a:extLst>
           </p:cNvPr>
@@ -13286,7 +13250,7 @@
           <p:cNvPr id="4" name="內容版面配置區 3">
             <a:extLst>
               <a:ext uri="{FF2B5EF4-FFF2-40B4-BE49-F238E27FC236}">
-                <a16:creationId xmlns:a16="http://schemas.microsoft.com/office/drawing/2014/main" xmlns="" id="{FCCA5DD9-09D4-479C-9F96-62D1622C7DB1}"/>
+                <a16:creationId xmlns="" xmlns:a16="http://schemas.microsoft.com/office/drawing/2014/main" id="{FCCA5DD9-09D4-479C-9F96-62D1622C7DB1}"/>
               </a:ext>
             </a:extLst>
           </p:cNvPr>
@@ -13483,7 +13447,7 @@
           <p:cNvPr id="19" name="標題 1">
             <a:extLst>
               <a:ext uri="{FF2B5EF4-FFF2-40B4-BE49-F238E27FC236}">
-                <a16:creationId xmlns:a16="http://schemas.microsoft.com/office/drawing/2014/main" xmlns="" id="{50E9A64D-4207-4980-8736-4201C3E0DC63}"/>
+                <a16:creationId xmlns="" xmlns:a16="http://schemas.microsoft.com/office/drawing/2014/main" id="{50E9A64D-4207-4980-8736-4201C3E0DC63}"/>
               </a:ext>
             </a:extLst>
           </p:cNvPr>
@@ -13523,7 +13487,7 @@
           <p:cNvPr id="24" name="內容版面配置區 2">
             <a:extLst>
               <a:ext uri="{FF2B5EF4-FFF2-40B4-BE49-F238E27FC236}">
-                <a16:creationId xmlns:a16="http://schemas.microsoft.com/office/drawing/2014/main" xmlns="" id="{F5C22ADD-7A5D-44F8-969C-F4721C016703}"/>
+                <a16:creationId xmlns="" xmlns:a16="http://schemas.microsoft.com/office/drawing/2014/main" id="{F5C22ADD-7A5D-44F8-969C-F4721C016703}"/>
               </a:ext>
             </a:extLst>
           </p:cNvPr>
@@ -13795,7 +13759,7 @@
           <p:cNvPr id="20" name="內容版面配置區 2">
             <a:extLst>
               <a:ext uri="{FF2B5EF4-FFF2-40B4-BE49-F238E27FC236}">
-                <a16:creationId xmlns:a16="http://schemas.microsoft.com/office/drawing/2014/main" xmlns="" id="{2E881D55-3B47-403F-8F0E-EDFDE34A1B22}"/>
+                <a16:creationId xmlns="" xmlns:a16="http://schemas.microsoft.com/office/drawing/2014/main" id="{2E881D55-3B47-403F-8F0E-EDFDE34A1B22}"/>
               </a:ext>
             </a:extLst>
           </p:cNvPr>
@@ -13908,7 +13872,7 @@
           <p:cNvPr id="4" name="標題 1">
             <a:extLst>
               <a:ext uri="{FF2B5EF4-FFF2-40B4-BE49-F238E27FC236}">
-                <a16:creationId xmlns:a16="http://schemas.microsoft.com/office/drawing/2014/main" xmlns="" id="{5E6B7CFB-F29E-40F1-941C-60839576EFD3}"/>
+                <a16:creationId xmlns="" xmlns:a16="http://schemas.microsoft.com/office/drawing/2014/main" id="{5E6B7CFB-F29E-40F1-941C-60839576EFD3}"/>
               </a:ext>
             </a:extLst>
           </p:cNvPr>
@@ -13974,7 +13938,7 @@
           <p:cNvPr id="5" name="內容版面配置區 2">
             <a:extLst>
               <a:ext uri="{FF2B5EF4-FFF2-40B4-BE49-F238E27FC236}">
-                <a16:creationId xmlns:a16="http://schemas.microsoft.com/office/drawing/2014/main" xmlns="" id="{A302D0AD-FC16-4984-8880-9A709EF0C7EB}"/>
+                <a16:creationId xmlns="" xmlns:a16="http://schemas.microsoft.com/office/drawing/2014/main" id="{A302D0AD-FC16-4984-8880-9A709EF0C7EB}"/>
               </a:ext>
             </a:extLst>
           </p:cNvPr>
@@ -14505,7 +14469,7 @@
           <p:cNvPr id="19" name="標題 1">
             <a:extLst>
               <a:ext uri="{FF2B5EF4-FFF2-40B4-BE49-F238E27FC236}">
-                <a16:creationId xmlns:a16="http://schemas.microsoft.com/office/drawing/2014/main" xmlns="" id="{50E9A64D-4207-4980-8736-4201C3E0DC63}"/>
+                <a16:creationId xmlns="" xmlns:a16="http://schemas.microsoft.com/office/drawing/2014/main" id="{50E9A64D-4207-4980-8736-4201C3E0DC63}"/>
               </a:ext>
             </a:extLst>
           </p:cNvPr>
@@ -14540,7 +14504,7 @@
           <p:cNvPr id="24" name="內容版面配置區 2">
             <a:extLst>
               <a:ext uri="{FF2B5EF4-FFF2-40B4-BE49-F238E27FC236}">
-                <a16:creationId xmlns:a16="http://schemas.microsoft.com/office/drawing/2014/main" xmlns="" id="{F5C22ADD-7A5D-44F8-969C-F4721C016703}"/>
+                <a16:creationId xmlns="" xmlns:a16="http://schemas.microsoft.com/office/drawing/2014/main" id="{F5C22ADD-7A5D-44F8-969C-F4721C016703}"/>
               </a:ext>
             </a:extLst>
           </p:cNvPr>
@@ -14802,13 +14766,7 @@
               <a:rPr lang="en-US" altLang="zh-TW" sz="1800" b="1" dirty="0">
                 <a:hlinkClick r:id="rId3"/>
               </a:rPr>
-              <a:t>https://</a:t>
-            </a:r>
-            <a:r>
-              <a:rPr lang="en-US" altLang="zh-TW" sz="1800" b="1" dirty="0">
-                <a:hlinkClick r:id="rId3"/>
-              </a:rPr>
-              <a:t>doi.org/10.1137/0218012</a:t>
+              <a:t>https://doi.org/10.1137/0218012</a:t>
             </a:r>
             <a:endParaRPr lang="en-US" altLang="zh-TW" sz="1800" b="1" dirty="0"/>
           </a:p>
@@ -14830,11 +14788,7 @@
             </a:r>
             <a:r>
               <a:rPr lang="en-US" altLang="zh-TW" sz="1800" b="1" dirty="0"/>
-              <a:t>, C. P. (1990). Efficient identification and signatures for smart cards. In G. Brassard </a:t>
-            </a:r>
-            <a:r>
-              <a:rPr lang="en-US" altLang="zh-TW" sz="1800" b="1" dirty="0"/>
-              <a:t>(Ed.), Advances in Cryptology – CRYPTO ’89 (Lecture Notes in Computer Science, Vol. 435, pp. 239–252). Springer. </a:t>
+              <a:t>, C. P. (1990). Efficient identification and signatures for smart cards. In G. Brassard (Ed.), Advances in Cryptology – CRYPTO ’89 (Lecture Notes in Computer Science, Vol. 435, pp. 239–252). Springer. </a:t>
             </a:r>
             <a:r>
               <a:rPr lang="en-US" altLang="zh-TW" sz="1800" b="1" dirty="0">
@@ -14864,11 +14818,7 @@
             </a:r>
             <a:r>
               <a:rPr lang="en-US" altLang="zh-TW" sz="1800" b="1" dirty="0"/>
-              <a:t>, A., &amp; Shamir, A. </a:t>
-            </a:r>
-            <a:r>
-              <a:rPr lang="en-US" altLang="zh-TW" sz="1800" b="1" dirty="0"/>
-              <a:t>(1987). How to prove yourself: Practical solutions to identification and signature problems. In A. M. </a:t>
+              <a:t>, A., &amp; Shamir, A. (1987). How to prove yourself: Practical solutions to identification and signature problems. In A. M. </a:t>
             </a:r>
             <a:r>
               <a:rPr lang="en-US" altLang="zh-TW" sz="1800" b="1" dirty="0" err="1"/>
@@ -15011,7 +14961,7 @@
           <p:cNvPr id="7" name="標題 1">
             <a:extLst>
               <a:ext uri="{FF2B5EF4-FFF2-40B4-BE49-F238E27FC236}">
-                <a16:creationId xmlns:a16="http://schemas.microsoft.com/office/drawing/2014/main" xmlns="" id="{50E9A64D-4207-4980-8736-4201C3E0DC63}"/>
+                <a16:creationId xmlns="" xmlns:a16="http://schemas.microsoft.com/office/drawing/2014/main" id="{50E9A64D-4207-4980-8736-4201C3E0DC63}"/>
               </a:ext>
             </a:extLst>
           </p:cNvPr>
@@ -15123,7 +15073,7 @@
           <p:cNvPr id="3" name="標題 2">
             <a:extLst>
               <a:ext uri="{FF2B5EF4-FFF2-40B4-BE49-F238E27FC236}">
-                <a16:creationId xmlns:a16="http://schemas.microsoft.com/office/drawing/2014/main" xmlns="" id="{4ABAB1B2-9811-49A5-968D-AA6F881D5BFC}"/>
+                <a16:creationId xmlns="" xmlns:a16="http://schemas.microsoft.com/office/drawing/2014/main" id="{4ABAB1B2-9811-49A5-968D-AA6F881D5BFC}"/>
               </a:ext>
             </a:extLst>
           </p:cNvPr>
@@ -15180,7 +15130,7 @@
           <p:cNvPr id="4" name="內容版面配置區 3">
             <a:extLst>
               <a:ext uri="{FF2B5EF4-FFF2-40B4-BE49-F238E27FC236}">
-                <a16:creationId xmlns:a16="http://schemas.microsoft.com/office/drawing/2014/main" xmlns="" id="{FCCA5DD9-09D4-479C-9F96-62D1622C7DB1}"/>
+                <a16:creationId xmlns="" xmlns:a16="http://schemas.microsoft.com/office/drawing/2014/main" id="{FCCA5DD9-09D4-479C-9F96-62D1622C7DB1}"/>
               </a:ext>
             </a:extLst>
           </p:cNvPr>
@@ -15356,7 +15306,7 @@
           <p:cNvPr id="19" name="標題 1">
             <a:extLst>
               <a:ext uri="{FF2B5EF4-FFF2-40B4-BE49-F238E27FC236}">
-                <a16:creationId xmlns:a16="http://schemas.microsoft.com/office/drawing/2014/main" xmlns="" id="{50E9A64D-4207-4980-8736-4201C3E0DC63}"/>
+                <a16:creationId xmlns="" xmlns:a16="http://schemas.microsoft.com/office/drawing/2014/main" id="{50E9A64D-4207-4980-8736-4201C3E0DC63}"/>
               </a:ext>
             </a:extLst>
           </p:cNvPr>
@@ -15392,7 +15342,7 @@
           <p:cNvPr id="24" name="內容版面配置區 2">
             <a:extLst>
               <a:ext uri="{FF2B5EF4-FFF2-40B4-BE49-F238E27FC236}">
-                <a16:creationId xmlns:a16="http://schemas.microsoft.com/office/drawing/2014/main" xmlns="" id="{F5C22ADD-7A5D-44F8-969C-F4721C016703}"/>
+                <a16:creationId xmlns="" xmlns:a16="http://schemas.microsoft.com/office/drawing/2014/main" id="{F5C22ADD-7A5D-44F8-969C-F4721C016703}"/>
               </a:ext>
             </a:extLst>
           </p:cNvPr>
@@ -16230,15 +16180,6 @@
               </a:rPr>
               <a:t> </a:t>
             </a:r>
-            <a:endParaRPr lang="zh-TW" altLang="en-US" sz="3000" b="1" dirty="0" smtClean="0">
-              <a:solidFill>
-                <a:schemeClr val="bg2">
-                  <a:lumMod val="50000"/>
-                </a:schemeClr>
-              </a:solidFill>
-              <a:latin typeface="微軟正黑體" panose="020B0604030504040204" pitchFamily="34" charset="-120"/>
-              <a:ea typeface="微軟正黑體" panose="020B0604030504040204" pitchFamily="34" charset="-120"/>
-            </a:endParaRPr>
           </a:p>
         </p:txBody>
       </p:sp>
@@ -16817,7 +16758,7 @@
           <p:cNvPr id="19" name="標題 1">
             <a:extLst>
               <a:ext uri="{FF2B5EF4-FFF2-40B4-BE49-F238E27FC236}">
-                <a16:creationId xmlns:a16="http://schemas.microsoft.com/office/drawing/2014/main" xmlns="" id="{50E9A64D-4207-4980-8736-4201C3E0DC63}"/>
+                <a16:creationId xmlns="" xmlns:a16="http://schemas.microsoft.com/office/drawing/2014/main" id="{50E9A64D-4207-4980-8736-4201C3E0DC63}"/>
               </a:ext>
             </a:extLst>
           </p:cNvPr>
@@ -16856,7 +16797,7 @@
           <p:cNvPr id="24" name="內容版面配置區 2">
             <a:extLst>
               <a:ext uri="{FF2B5EF4-FFF2-40B4-BE49-F238E27FC236}">
-                <a16:creationId xmlns:a16="http://schemas.microsoft.com/office/drawing/2014/main" xmlns="" id="{F5C22ADD-7A5D-44F8-969C-F4721C016703}"/>
+                <a16:creationId xmlns="" xmlns:a16="http://schemas.microsoft.com/office/drawing/2014/main" id="{F5C22ADD-7A5D-44F8-969C-F4721C016703}"/>
               </a:ext>
             </a:extLst>
           </p:cNvPr>
@@ -17128,7 +17069,7 @@
           <p:cNvPr id="20" name="內容版面配置區 2">
             <a:extLst>
               <a:ext uri="{FF2B5EF4-FFF2-40B4-BE49-F238E27FC236}">
-                <a16:creationId xmlns:a16="http://schemas.microsoft.com/office/drawing/2014/main" xmlns="" id="{2E881D55-3B47-403F-8F0E-EDFDE34A1B22}"/>
+                <a16:creationId xmlns="" xmlns:a16="http://schemas.microsoft.com/office/drawing/2014/main" id="{2E881D55-3B47-403F-8F0E-EDFDE34A1B22}"/>
               </a:ext>
             </a:extLst>
           </p:cNvPr>
@@ -17346,7 +17287,7 @@
           <p:cNvPr id="3" name="標題 2">
             <a:extLst>
               <a:ext uri="{FF2B5EF4-FFF2-40B4-BE49-F238E27FC236}">
-                <a16:creationId xmlns:a16="http://schemas.microsoft.com/office/drawing/2014/main" xmlns="" id="{4ABAB1B2-9811-49A5-968D-AA6F881D5BFC}"/>
+                <a16:creationId xmlns="" xmlns:a16="http://schemas.microsoft.com/office/drawing/2014/main" id="{4ABAB1B2-9811-49A5-968D-AA6F881D5BFC}"/>
               </a:ext>
             </a:extLst>
           </p:cNvPr>
@@ -17415,7 +17356,7 @@
           <p:cNvPr id="4" name="內容版面配置區 3">
             <a:extLst>
               <a:ext uri="{FF2B5EF4-FFF2-40B4-BE49-F238E27FC236}">
-                <a16:creationId xmlns:a16="http://schemas.microsoft.com/office/drawing/2014/main" xmlns="" id="{FCCA5DD9-09D4-479C-9F96-62D1622C7DB1}"/>
+                <a16:creationId xmlns="" xmlns:a16="http://schemas.microsoft.com/office/drawing/2014/main" id="{FCCA5DD9-09D4-479C-9F96-62D1622C7DB1}"/>
               </a:ext>
             </a:extLst>
           </p:cNvPr>
@@ -17678,7 +17619,7 @@
           <p:cNvPr id="19" name="標題 1">
             <a:extLst>
               <a:ext uri="{FF2B5EF4-FFF2-40B4-BE49-F238E27FC236}">
-                <a16:creationId xmlns:a16="http://schemas.microsoft.com/office/drawing/2014/main" xmlns="" id="{50E9A64D-4207-4980-8736-4201C3E0DC63}"/>
+                <a16:creationId xmlns="" xmlns:a16="http://schemas.microsoft.com/office/drawing/2014/main" id="{50E9A64D-4207-4980-8736-4201C3E0DC63}"/>
               </a:ext>
             </a:extLst>
           </p:cNvPr>
@@ -17718,7 +17659,7 @@
           <p:cNvPr id="24" name="內容版面配置區 2">
             <a:extLst>
               <a:ext uri="{FF2B5EF4-FFF2-40B4-BE49-F238E27FC236}">
-                <a16:creationId xmlns:a16="http://schemas.microsoft.com/office/drawing/2014/main" xmlns="" id="{F5C22ADD-7A5D-44F8-969C-F4721C016703}"/>
+                <a16:creationId xmlns="" xmlns:a16="http://schemas.microsoft.com/office/drawing/2014/main" id="{F5C22ADD-7A5D-44F8-969C-F4721C016703}"/>
               </a:ext>
             </a:extLst>
           </p:cNvPr>
@@ -18484,10 +18425,6 @@
               </a:rPr>
               <a:t>[2]</a:t>
             </a:r>
-            <a:endParaRPr lang="en-US" altLang="zh-TW" sz="1200" b="1" dirty="0" smtClean="0">
-              <a:latin typeface="微軟正黑體" panose="020B0604030504040204" pitchFamily="34" charset="-120"/>
-              <a:ea typeface="微軟正黑體" panose="020B0604030504040204" pitchFamily="34" charset="-120"/>
-            </a:endParaRPr>
           </a:p>
           <a:p>
             <a:pPr algn="just"/>
@@ -18773,17 +18710,7 @@
                 <a:latin typeface="微軟正黑體" panose="020B0604030504040204" pitchFamily="34" charset="-120"/>
                 <a:ea typeface="微軟正黑體" panose="020B0604030504040204" pitchFamily="34" charset="-120"/>
               </a:rPr>
-              <a:t>仍</a:t>
-            </a:r>
-            <a:r>
-              <a:rPr lang="zh-TW" altLang="zh-TW" b="1" dirty="0" smtClean="0">
-                <a:solidFill>
-                  <a:srgbClr val="FF0000"/>
-                </a:solidFill>
-                <a:latin typeface="微軟正黑體" panose="020B0604030504040204" pitchFamily="34" charset="-120"/>
-                <a:ea typeface="微軟正黑體" panose="020B0604030504040204" pitchFamily="34" charset="-120"/>
-              </a:rPr>
-              <a:t>屬互動式</a:t>
+              <a:t>仍屬互動式</a:t>
             </a:r>
             <a:r>
               <a:rPr lang="zh-TW" altLang="zh-TW" b="1" dirty="0">
@@ -19146,7 +19073,7 @@
           <p:cNvPr id="3" name="標題 2">
             <a:extLst>
               <a:ext uri="{FF2B5EF4-FFF2-40B4-BE49-F238E27FC236}">
-                <a16:creationId xmlns:a16="http://schemas.microsoft.com/office/drawing/2014/main" xmlns="" id="{4ABAB1B2-9811-49A5-968D-AA6F881D5BFC}"/>
+                <a16:creationId xmlns="" xmlns:a16="http://schemas.microsoft.com/office/drawing/2014/main" id="{4ABAB1B2-9811-49A5-968D-AA6F881D5BFC}"/>
               </a:ext>
             </a:extLst>
           </p:cNvPr>
@@ -19263,7 +19190,7 @@
           <p:cNvPr id="5" name="內容版面配置區 3">
             <a:extLst>
               <a:ext uri="{FF2B5EF4-FFF2-40B4-BE49-F238E27FC236}">
-                <a16:creationId xmlns:a16="http://schemas.microsoft.com/office/drawing/2014/main" xmlns="" id="{FCCA5DD9-09D4-479C-9F96-62D1622C7DB1}"/>
+                <a16:creationId xmlns="" xmlns:a16="http://schemas.microsoft.com/office/drawing/2014/main" id="{FCCA5DD9-09D4-479C-9F96-62D1622C7DB1}"/>
               </a:ext>
             </a:extLst>
           </p:cNvPr>
@@ -19569,11 +19496,7 @@
             </a:r>
             <a:r>
               <a:rPr lang="en-US" altLang="zh-TW" sz="2400" dirty="0" smtClean="0"/>
-              <a:t> </a:t>
-            </a:r>
-            <a:r>
-              <a:rPr lang="en-US" altLang="zh-TW" sz="2400" dirty="0" smtClean="0"/>
-              <a:t>Protocol</a:t>
+              <a:t> Protocol</a:t>
             </a:r>
             <a:r>
               <a:rPr lang="zh-TW" altLang="en-US" sz="2400" dirty="0" smtClean="0"/>
@@ -19707,7 +19630,7 @@
           <p:cNvPr id="19" name="標題 1">
             <a:extLst>
               <a:ext uri="{FF2B5EF4-FFF2-40B4-BE49-F238E27FC236}">
-                <a16:creationId xmlns:a16="http://schemas.microsoft.com/office/drawing/2014/main" xmlns="" id="{50E9A64D-4207-4980-8736-4201C3E0DC63}"/>
+                <a16:creationId xmlns="" xmlns:a16="http://schemas.microsoft.com/office/drawing/2014/main" id="{50E9A64D-4207-4980-8736-4201C3E0DC63}"/>
               </a:ext>
             </a:extLst>
           </p:cNvPr>
@@ -19783,7 +19706,7 @@
           <p:cNvPr id="24" name="內容版面配置區 2">
             <a:extLst>
               <a:ext uri="{FF2B5EF4-FFF2-40B4-BE49-F238E27FC236}">
-                <a16:creationId xmlns:a16="http://schemas.microsoft.com/office/drawing/2014/main" xmlns="" id="{F5C22ADD-7A5D-44F8-969C-F4721C016703}"/>
+                <a16:creationId xmlns="" xmlns:a16="http://schemas.microsoft.com/office/drawing/2014/main" id="{F5C22ADD-7A5D-44F8-969C-F4721C016703}"/>
               </a:ext>
             </a:extLst>
           </p:cNvPr>
@@ -20149,7 +20072,7 @@
               <p:cNvPr id="20" name="內容版面配置區 2">
                 <a:extLst>
                   <a:ext uri="{FF2B5EF4-FFF2-40B4-BE49-F238E27FC236}">
-                    <a16:creationId xmlns:a16="http://schemas.microsoft.com/office/drawing/2014/main" xmlns="" id="{2E881D55-3B47-403F-8F0E-EDFDE34A1B22}"/>
+                    <a16:creationId xmlns="" xmlns:a16="http://schemas.microsoft.com/office/drawing/2014/main" id="{2E881D55-3B47-403F-8F0E-EDFDE34A1B22}"/>
                   </a:ext>
                 </a:extLst>
               </p:cNvPr>
@@ -21169,7 +21092,7 @@
   <a:extraClrSchemeLst/>
   <a:extLst>
     <a:ext uri="{05A4C25C-085E-4340-85A3-A5531E510DB2}">
-      <thm15:themeFamily xmlns:thm15="http://schemas.microsoft.com/office/thememl/2012/main" xmlns="" name="Office_26713188_TF03460544" id="{6F554B24-2C09-4153-BF01-57653ED04444}" vid="{C80FED5E-EC00-4C61-90A9-0EA5EF995274}"/>
+      <thm15:themeFamily xmlns="" xmlns:thm15="http://schemas.microsoft.com/office/thememl/2012/main" name="Office_26713188_TF03460544" id="{6F554B24-2C09-4153-BF01-57653ED04444}" vid="{C80FED5E-EC00-4C61-90A9-0EA5EF995274}"/>
     </a:ext>
   </a:extLst>
 </a:theme>

</xml_diff>

<commit_message>
Add G3C Graph for slide.
</commit_message>
<xml_diff>
--- a/密碼學期末專題簡報.pptx
+++ b/密碼學期末專題簡報.pptx
@@ -132,7 +132,7 @@
   </p:defaultTextStyle>
   <p:extLst>
     <p:ext uri="{EFAFB233-063F-42B5-8137-9DF3F51BA10A}">
-      <p15:sldGuideLst xmlns="" xmlns:p15="http://schemas.microsoft.com/office/powerpoint/2012/main">
+      <p15:sldGuideLst xmlns:p15="http://schemas.microsoft.com/office/powerpoint/2012/main" xmlns="">
         <p15:guide id="1" orient="horz" pos="2160">
           <p15:clr>
             <a:srgbClr val="A4A3A4"/>
@@ -161,7 +161,7 @@
       </p15:sldGuideLst>
     </p:ext>
     <p:ext uri="{2D200454-40CA-4A62-9FC3-DE9A4176ACB9}">
-      <p15:notesGuideLst xmlns="" xmlns:p15="http://schemas.microsoft.com/office/powerpoint/2012/main">
+      <p15:notesGuideLst xmlns:p15="http://schemas.microsoft.com/office/powerpoint/2012/main" xmlns="">
         <p15:guide id="1" orient="horz" pos="2880">
           <p15:clr>
             <a:srgbClr val="A4A3A4"/>
@@ -268,7 +268,7 @@
                 <a:latin typeface="Microsoft JhengHei UI" panose="020B0604030504040204" pitchFamily="34" charset="-120"/>
                 <a:ea typeface="Microsoft JhengHei UI" panose="020B0604030504040204" pitchFamily="34" charset="-120"/>
               </a:rPr>
-              <a:t>2025/5/23</a:t>
+              <a:t>2025/5/27</a:t>
             </a:fld>
             <a:endParaRPr lang="zh-TW" altLang="en-US">
               <a:latin typeface="Microsoft JhengHei UI" panose="020B0604030504040204" pitchFamily="34" charset="-120"/>
@@ -454,7 +454,7 @@
           <a:p>
             <a:fld id="{B0A587AB-C785-4ECC-B9BB-3D529D1F06DC}" type="datetime1">
               <a:rPr lang="zh-TW" altLang="en-US" noProof="0" smtClean="0"/>
-              <a:t>2025/5/23</a:t>
+              <a:t>2025/5/27</a:t>
             </a:fld>
             <a:endParaRPr lang="zh-TW" altLang="en-US" noProof="0" dirty="0"/>
           </a:p>
@@ -2890,7 +2890,7 @@
           <a:p>
             <a:fld id="{7025A1CD-099F-4E6B-845B-76AC65CEDBE7}" type="datetime1">
               <a:rPr lang="zh-TW" altLang="en-US" noProof="0" smtClean="0"/>
-              <a:t>2025/5/23</a:t>
+              <a:t>2025/5/27</a:t>
             </a:fld>
             <a:endParaRPr lang="zh-TW" altLang="en-US" noProof="0"/>
           </a:p>
@@ -2937,7 +2937,7 @@
           <p:cNvPr id="17" name="Picture 2" descr="國立臺灣大學">
             <a:extLst>
               <a:ext uri="{FF2B5EF4-FFF2-40B4-BE49-F238E27FC236}">
-                <a16:creationId xmlns="" xmlns:a16="http://schemas.microsoft.com/office/drawing/2014/main" id="{84C36C24-3B92-4925-8868-E617BA10AC38}"/>
+                <a16:creationId xmlns:a16="http://schemas.microsoft.com/office/drawing/2014/main" xmlns="" id="{84C36C24-3B92-4925-8868-E617BA10AC38}"/>
               </a:ext>
             </a:extLst>
           </p:cNvPr>
@@ -3314,7 +3314,7 @@
           <a:p>
             <a:fld id="{8A66919C-2879-4964-ADA5-05BE97665E98}" type="datetime1">
               <a:rPr lang="zh-TW" altLang="en-US" noProof="0" smtClean="0"/>
-              <a:t>2025/5/23</a:t>
+              <a:t>2025/5/27</a:t>
             </a:fld>
             <a:endParaRPr lang="zh-TW" altLang="en-US" noProof="0"/>
           </a:p>
@@ -3570,7 +3570,7 @@
           <a:p>
             <a:fld id="{C9FD95EC-10DD-4475-A030-8C9B84211375}" type="datetime1">
               <a:rPr lang="zh-TW" altLang="en-US" noProof="0" smtClean="0"/>
-              <a:t>2025/5/23</a:t>
+              <a:t>2025/5/27</a:t>
             </a:fld>
             <a:endParaRPr lang="zh-TW" altLang="en-US" noProof="0"/>
           </a:p>
@@ -3836,7 +3836,7 @@
           <a:p>
             <a:fld id="{FD4B027F-A9C0-4F33-A679-F17E60001344}" type="datetime1">
               <a:rPr lang="zh-TW" altLang="en-US" noProof="0" smtClean="0"/>
-              <a:t>2025/5/23</a:t>
+              <a:t>2025/5/27</a:t>
             </a:fld>
             <a:endParaRPr lang="zh-TW" altLang="en-US" noProof="0"/>
           </a:p>
@@ -4082,7 +4082,7 @@
           <a:p>
             <a:fld id="{EF3A231D-725F-43B6-A03C-0D1B80D07BE1}" type="datetime1">
               <a:rPr lang="zh-TW" altLang="en-US" noProof="0" smtClean="0"/>
-              <a:t>2025/5/23</a:t>
+              <a:t>2025/5/27</a:t>
             </a:fld>
             <a:endParaRPr lang="zh-TW" altLang="en-US" noProof="0"/>
           </a:p>
@@ -4338,7 +4338,7 @@
           <a:p>
             <a:fld id="{A1C8904F-070E-49CB-AD43-64EDE507F9B7}" type="datetime1">
               <a:rPr lang="zh-TW" altLang="en-US" noProof="0" smtClean="0"/>
-              <a:t>2025/5/23</a:t>
+              <a:t>2025/5/27</a:t>
             </a:fld>
             <a:endParaRPr lang="zh-TW" altLang="en-US" noProof="0"/>
           </a:p>
@@ -4491,7 +4491,7 @@
           <a:p>
             <a:fld id="{1A4D21C7-088F-4C14-AA88-F5DDEF7465A6}" type="datetime1">
               <a:rPr lang="zh-TW" altLang="en-US" noProof="0" smtClean="0"/>
-              <a:t>2025/5/23</a:t>
+              <a:t>2025/5/27</a:t>
             </a:fld>
             <a:endParaRPr lang="zh-TW" altLang="en-US" noProof="0"/>
           </a:p>
@@ -4536,7 +4536,7 @@
           <p:cNvPr id="2050" name="Picture 2" descr="台大遴選會決定遭駁回管中閔不是校長了，台灣學到什麼教訓？｜天下雜誌">
             <a:extLst>
               <a:ext uri="{FF2B5EF4-FFF2-40B4-BE49-F238E27FC236}">
-                <a16:creationId xmlns="" xmlns:a16="http://schemas.microsoft.com/office/drawing/2014/main" id="{AD25CCFA-A169-4B4D-9AAB-4FD3CE0117D8}"/>
+                <a16:creationId xmlns:a16="http://schemas.microsoft.com/office/drawing/2014/main" xmlns="" id="{AD25CCFA-A169-4B4D-9AAB-4FD3CE0117D8}"/>
               </a:ext>
             </a:extLst>
           </p:cNvPr>
@@ -4575,7 +4575,7 @@
           <p:cNvPr id="9" name="標題 1">
             <a:extLst>
               <a:ext uri="{FF2B5EF4-FFF2-40B4-BE49-F238E27FC236}">
-                <a16:creationId xmlns="" xmlns:a16="http://schemas.microsoft.com/office/drawing/2014/main" id="{BDFD2411-5069-4CA5-B66E-AB62E7A1DE60}"/>
+                <a16:creationId xmlns:a16="http://schemas.microsoft.com/office/drawing/2014/main" xmlns="" id="{BDFD2411-5069-4CA5-B66E-AB62E7A1DE60}"/>
               </a:ext>
             </a:extLst>
           </p:cNvPr>
@@ -4618,7 +4618,7 @@
           <p:cNvPr id="10" name="內容預留位置 2">
             <a:extLst>
               <a:ext uri="{FF2B5EF4-FFF2-40B4-BE49-F238E27FC236}">
-                <a16:creationId xmlns="" xmlns:a16="http://schemas.microsoft.com/office/drawing/2014/main" id="{BDA314B9-2928-4296-A8F2-C460B7717FDB}"/>
+                <a16:creationId xmlns:a16="http://schemas.microsoft.com/office/drawing/2014/main" xmlns="" id="{BDA314B9-2928-4296-A8F2-C460B7717FDB}"/>
               </a:ext>
             </a:extLst>
           </p:cNvPr>
@@ -4812,7 +4812,7 @@
           <a:p>
             <a:fld id="{07AFF883-2F10-4A07-ABF7-3E7D71A2862B}" type="datetime1">
               <a:rPr lang="zh-TW" altLang="en-US" noProof="0" smtClean="0"/>
-              <a:t>2025/5/23</a:t>
+              <a:t>2025/5/27</a:t>
             </a:fld>
             <a:endParaRPr lang="zh-TW" altLang="en-US" noProof="0"/>
           </a:p>
@@ -4857,7 +4857,7 @@
           <p:cNvPr id="2" name="箭號: 五邊形 1">
             <a:extLst>
               <a:ext uri="{FF2B5EF4-FFF2-40B4-BE49-F238E27FC236}">
-                <a16:creationId xmlns="" xmlns:a16="http://schemas.microsoft.com/office/drawing/2014/main" id="{2B2A4164-FC51-40C1-8307-BD11C0F8CFB5}"/>
+                <a16:creationId xmlns:a16="http://schemas.microsoft.com/office/drawing/2014/main" xmlns="" id="{2B2A4164-FC51-40C1-8307-BD11C0F8CFB5}"/>
               </a:ext>
             </a:extLst>
           </p:cNvPr>
@@ -4914,7 +4914,7 @@
           <p:cNvPr id="8" name="箭號: 五邊形 7">
             <a:extLst>
               <a:ext uri="{FF2B5EF4-FFF2-40B4-BE49-F238E27FC236}">
-                <a16:creationId xmlns="" xmlns:a16="http://schemas.microsoft.com/office/drawing/2014/main" id="{A42C3E17-FE95-45A4-BE55-35C930896E44}"/>
+                <a16:creationId xmlns:a16="http://schemas.microsoft.com/office/drawing/2014/main" xmlns="" id="{A42C3E17-FE95-45A4-BE55-35C930896E44}"/>
               </a:ext>
             </a:extLst>
           </p:cNvPr>
@@ -4971,7 +4971,7 @@
           <p:cNvPr id="9" name="Picture 2" descr="國立臺灣大學">
             <a:extLst>
               <a:ext uri="{FF2B5EF4-FFF2-40B4-BE49-F238E27FC236}">
-                <a16:creationId xmlns="" xmlns:a16="http://schemas.microsoft.com/office/drawing/2014/main" id="{2E88D82B-E998-4EDD-80FE-2F0EDEAEB0EB}"/>
+                <a16:creationId xmlns:a16="http://schemas.microsoft.com/office/drawing/2014/main" xmlns="" id="{2E88D82B-E998-4EDD-80FE-2F0EDEAEB0EB}"/>
               </a:ext>
             </a:extLst>
           </p:cNvPr>
@@ -5018,7 +5018,7 @@
           <p:cNvPr id="10" name="標題 1">
             <a:extLst>
               <a:ext uri="{FF2B5EF4-FFF2-40B4-BE49-F238E27FC236}">
-                <a16:creationId xmlns="" xmlns:a16="http://schemas.microsoft.com/office/drawing/2014/main" id="{93ABB2D6-1831-4B6F-8B8F-924BF377F7F3}"/>
+                <a16:creationId xmlns:a16="http://schemas.microsoft.com/office/drawing/2014/main" xmlns="" id="{93ABB2D6-1831-4B6F-8B8F-924BF377F7F3}"/>
               </a:ext>
             </a:extLst>
           </p:cNvPr>
@@ -5064,7 +5064,7 @@
           <p:cNvPr id="11" name="內容預留位置 2">
             <a:extLst>
               <a:ext uri="{FF2B5EF4-FFF2-40B4-BE49-F238E27FC236}">
-                <a16:creationId xmlns="" xmlns:a16="http://schemas.microsoft.com/office/drawing/2014/main" id="{802C1E61-2E34-4316-8FE7-FDF47C3C8932}"/>
+                <a16:creationId xmlns:a16="http://schemas.microsoft.com/office/drawing/2014/main" xmlns="" id="{802C1E61-2E34-4316-8FE7-FDF47C3C8932}"/>
               </a:ext>
             </a:extLst>
           </p:cNvPr>
@@ -5516,7 +5516,7 @@
           <a:p>
             <a:fld id="{492DEF5F-C38C-430A-A0DE-47FE9CE7FE7F}" type="datetime1">
               <a:rPr lang="zh-TW" altLang="en-US" noProof="0" smtClean="0"/>
-              <a:t>2025/5/23</a:t>
+              <a:t>2025/5/27</a:t>
             </a:fld>
             <a:endParaRPr lang="zh-TW" altLang="en-US" noProof="0"/>
           </a:p>
@@ -6026,7 +6026,7 @@
           <a:p>
             <a:fld id="{FB53CE18-37B0-4354-95BA-F6E2958D7E39}" type="datetime1">
               <a:rPr lang="zh-TW" altLang="en-US" noProof="0" smtClean="0"/>
-              <a:t>2025/5/23</a:t>
+              <a:t>2025/5/27</a:t>
             </a:fld>
             <a:endParaRPr lang="zh-TW" altLang="en-US" noProof="0"/>
           </a:p>
@@ -6188,7 +6188,7 @@
           <a:p>
             <a:fld id="{840D92E5-0E9E-447B-AB12-50B31DB78792}" type="datetime1">
               <a:rPr lang="zh-TW" altLang="en-US" noProof="0" smtClean="0"/>
-              <a:t>2025/5/23</a:t>
+              <a:t>2025/5/27</a:t>
             </a:fld>
             <a:endParaRPr lang="zh-TW" altLang="en-US" noProof="0"/>
           </a:p>
@@ -6479,7 +6479,7 @@
           <a:p>
             <a:fld id="{2DBDA392-58F4-49D0-A77B-A750F0E30EC9}" type="datetime1">
               <a:rPr lang="zh-TW" altLang="en-US" noProof="0" smtClean="0"/>
-              <a:t>2025/5/23</a:t>
+              <a:t>2025/5/27</a:t>
             </a:fld>
             <a:endParaRPr lang="zh-TW" altLang="en-US" noProof="0"/>
           </a:p>
@@ -6874,7 +6874,7 @@
           <a:p>
             <a:fld id="{6ADA41C7-C7E8-4EC2-8EC0-5E7AFDF89795}" type="datetime1">
               <a:rPr lang="zh-TW" altLang="en-US" noProof="0" smtClean="0"/>
-              <a:t>2025/5/23</a:t>
+              <a:t>2025/5/27</a:t>
             </a:fld>
             <a:endParaRPr lang="zh-TW" altLang="en-US" noProof="0"/>
           </a:p>
@@ -7448,7 +7448,7 @@
           <a:p>
             <a:fld id="{F1139FD8-5407-4A67-A886-B56A7B50E975}" type="datetime1">
               <a:rPr lang="zh-TW" altLang="en-US" noProof="0" smtClean="0"/>
-              <a:t>2025/5/23</a:t>
+              <a:t>2025/5/27</a:t>
             </a:fld>
             <a:endParaRPr lang="zh-TW" altLang="en-US" noProof="0"/>
           </a:p>
@@ -8255,7 +8255,7 @@
           <p:cNvPr id="19" name="標題 1">
             <a:extLst>
               <a:ext uri="{FF2B5EF4-FFF2-40B4-BE49-F238E27FC236}">
-                <a16:creationId xmlns="" xmlns:a16="http://schemas.microsoft.com/office/drawing/2014/main" id="{50E9A64D-4207-4980-8736-4201C3E0DC63}"/>
+                <a16:creationId xmlns:a16="http://schemas.microsoft.com/office/drawing/2014/main" xmlns="" id="{50E9A64D-4207-4980-8736-4201C3E0DC63}"/>
               </a:ext>
             </a:extLst>
           </p:cNvPr>
@@ -8331,7 +8331,7 @@
           <p:cNvPr id="24" name="內容版面配置區 2">
             <a:extLst>
               <a:ext uri="{FF2B5EF4-FFF2-40B4-BE49-F238E27FC236}">
-                <a16:creationId xmlns="" xmlns:a16="http://schemas.microsoft.com/office/drawing/2014/main" id="{F5C22ADD-7A5D-44F8-969C-F4721C016703}"/>
+                <a16:creationId xmlns:a16="http://schemas.microsoft.com/office/drawing/2014/main" xmlns="" id="{F5C22ADD-7A5D-44F8-969C-F4721C016703}"/>
               </a:ext>
             </a:extLst>
           </p:cNvPr>
@@ -8822,7 +8822,7 @@
               <p:cNvPr id="10" name="內容版面配置區 2">
                 <a:extLst>
                   <a:ext uri="{FF2B5EF4-FFF2-40B4-BE49-F238E27FC236}">
-                    <a16:creationId xmlns="" xmlns:a16="http://schemas.microsoft.com/office/drawing/2014/main" id="{2E881D55-3B47-403F-8F0E-EDFDE34A1B22}"/>
+                    <a16:creationId xmlns:a16="http://schemas.microsoft.com/office/drawing/2014/main" xmlns="" id="{2E881D55-3B47-403F-8F0E-EDFDE34A1B22}"/>
                   </a:ext>
                 </a:extLst>
               </p:cNvPr>
@@ -9056,7 +9056,7 @@
           <p:cNvPr id="19" name="標題 1">
             <a:extLst>
               <a:ext uri="{FF2B5EF4-FFF2-40B4-BE49-F238E27FC236}">
-                <a16:creationId xmlns="" xmlns:a16="http://schemas.microsoft.com/office/drawing/2014/main" id="{50E9A64D-4207-4980-8736-4201C3E0DC63}"/>
+                <a16:creationId xmlns:a16="http://schemas.microsoft.com/office/drawing/2014/main" xmlns="" id="{50E9A64D-4207-4980-8736-4201C3E0DC63}"/>
               </a:ext>
             </a:extLst>
           </p:cNvPr>
@@ -9132,7 +9132,7 @@
           <p:cNvPr id="24" name="內容版面配置區 2">
             <a:extLst>
               <a:ext uri="{FF2B5EF4-FFF2-40B4-BE49-F238E27FC236}">
-                <a16:creationId xmlns="" xmlns:a16="http://schemas.microsoft.com/office/drawing/2014/main" id="{F5C22ADD-7A5D-44F8-969C-F4721C016703}"/>
+                <a16:creationId xmlns:a16="http://schemas.microsoft.com/office/drawing/2014/main" xmlns="" id="{F5C22ADD-7A5D-44F8-969C-F4721C016703}"/>
               </a:ext>
             </a:extLst>
           </p:cNvPr>
@@ -9602,7 +9602,7 @@
           <p:cNvPr id="24" name="內容版面配置區 2">
             <a:extLst>
               <a:ext uri="{FF2B5EF4-FFF2-40B4-BE49-F238E27FC236}">
-                <a16:creationId xmlns="" xmlns:a16="http://schemas.microsoft.com/office/drawing/2014/main" id="{F5C22ADD-7A5D-44F8-969C-F4721C016703}"/>
+                <a16:creationId xmlns:a16="http://schemas.microsoft.com/office/drawing/2014/main" xmlns="" id="{F5C22ADD-7A5D-44F8-969C-F4721C016703}"/>
               </a:ext>
             </a:extLst>
           </p:cNvPr>
@@ -9916,7 +9916,7 @@
               <p:cNvPr id="10" name="內容版面配置區 2">
                 <a:extLst>
                   <a:ext uri="{FF2B5EF4-FFF2-40B4-BE49-F238E27FC236}">
-                    <a16:creationId xmlns="" xmlns:a16="http://schemas.microsoft.com/office/drawing/2014/main" id="{2E881D55-3B47-403F-8F0E-EDFDE34A1B22}"/>
+                    <a16:creationId xmlns:a16="http://schemas.microsoft.com/office/drawing/2014/main" xmlns="" id="{2E881D55-3B47-403F-8F0E-EDFDE34A1B22}"/>
                   </a:ext>
                 </a:extLst>
               </p:cNvPr>
@@ -10639,7 +10639,7 @@
           <p:cNvPr id="19" name="標題 1">
             <a:extLst>
               <a:ext uri="{FF2B5EF4-FFF2-40B4-BE49-F238E27FC236}">
-                <a16:creationId xmlns="" xmlns:a16="http://schemas.microsoft.com/office/drawing/2014/main" id="{50E9A64D-4207-4980-8736-4201C3E0DC63}"/>
+                <a16:creationId xmlns:a16="http://schemas.microsoft.com/office/drawing/2014/main" xmlns="" id="{50E9A64D-4207-4980-8736-4201C3E0DC63}"/>
               </a:ext>
             </a:extLst>
           </p:cNvPr>
@@ -10788,7 +10788,7 @@
           <p:cNvPr id="19" name="標題 1">
             <a:extLst>
               <a:ext uri="{FF2B5EF4-FFF2-40B4-BE49-F238E27FC236}">
-                <a16:creationId xmlns="" xmlns:a16="http://schemas.microsoft.com/office/drawing/2014/main" id="{50E9A64D-4207-4980-8736-4201C3E0DC63}"/>
+                <a16:creationId xmlns:a16="http://schemas.microsoft.com/office/drawing/2014/main" xmlns="" id="{50E9A64D-4207-4980-8736-4201C3E0DC63}"/>
               </a:ext>
             </a:extLst>
           </p:cNvPr>
@@ -10864,7 +10864,7 @@
           <p:cNvPr id="24" name="內容版面配置區 2">
             <a:extLst>
               <a:ext uri="{FF2B5EF4-FFF2-40B4-BE49-F238E27FC236}">
-                <a16:creationId xmlns="" xmlns:a16="http://schemas.microsoft.com/office/drawing/2014/main" id="{F5C22ADD-7A5D-44F8-969C-F4721C016703}"/>
+                <a16:creationId xmlns:a16="http://schemas.microsoft.com/office/drawing/2014/main" xmlns="" id="{F5C22ADD-7A5D-44F8-969C-F4721C016703}"/>
               </a:ext>
             </a:extLst>
           </p:cNvPr>
@@ -11325,7 +11325,7 @@
           <p:cNvPr id="19" name="標題 1">
             <a:extLst>
               <a:ext uri="{FF2B5EF4-FFF2-40B4-BE49-F238E27FC236}">
-                <a16:creationId xmlns="" xmlns:a16="http://schemas.microsoft.com/office/drawing/2014/main" id="{50E9A64D-4207-4980-8736-4201C3E0DC63}"/>
+                <a16:creationId xmlns:a16="http://schemas.microsoft.com/office/drawing/2014/main" xmlns="" id="{50E9A64D-4207-4980-8736-4201C3E0DC63}"/>
               </a:ext>
             </a:extLst>
           </p:cNvPr>
@@ -11401,7 +11401,7 @@
           <p:cNvPr id="24" name="內容版面配置區 2">
             <a:extLst>
               <a:ext uri="{FF2B5EF4-FFF2-40B4-BE49-F238E27FC236}">
-                <a16:creationId xmlns="" xmlns:a16="http://schemas.microsoft.com/office/drawing/2014/main" id="{F5C22ADD-7A5D-44F8-969C-F4721C016703}"/>
+                <a16:creationId xmlns:a16="http://schemas.microsoft.com/office/drawing/2014/main" xmlns="" id="{F5C22ADD-7A5D-44F8-969C-F4721C016703}"/>
               </a:ext>
             </a:extLst>
           </p:cNvPr>
@@ -11915,7 +11915,7 @@
           <p:cNvPr id="24" name="內容版面配置區 2">
             <a:extLst>
               <a:ext uri="{FF2B5EF4-FFF2-40B4-BE49-F238E27FC236}">
-                <a16:creationId xmlns="" xmlns:a16="http://schemas.microsoft.com/office/drawing/2014/main" id="{F5C22ADD-7A5D-44F8-969C-F4721C016703}"/>
+                <a16:creationId xmlns:a16="http://schemas.microsoft.com/office/drawing/2014/main" xmlns="" id="{F5C22ADD-7A5D-44F8-969C-F4721C016703}"/>
               </a:ext>
             </a:extLst>
           </p:cNvPr>
@@ -12255,7 +12255,7 @@
           <p:cNvPr id="10" name="內容版面配置區 2">
             <a:extLst>
               <a:ext uri="{FF2B5EF4-FFF2-40B4-BE49-F238E27FC236}">
-                <a16:creationId xmlns="" xmlns:a16="http://schemas.microsoft.com/office/drawing/2014/main" id="{2E881D55-3B47-403F-8F0E-EDFDE34A1B22}"/>
+                <a16:creationId xmlns:a16="http://schemas.microsoft.com/office/drawing/2014/main" xmlns="" id="{2E881D55-3B47-403F-8F0E-EDFDE34A1B22}"/>
               </a:ext>
             </a:extLst>
           </p:cNvPr>
@@ -12366,7 +12366,7 @@
           <p:cNvPr id="19" name="標題 1">
             <a:extLst>
               <a:ext uri="{FF2B5EF4-FFF2-40B4-BE49-F238E27FC236}">
-                <a16:creationId xmlns="" xmlns:a16="http://schemas.microsoft.com/office/drawing/2014/main" id="{50E9A64D-4207-4980-8736-4201C3E0DC63}"/>
+                <a16:creationId xmlns:a16="http://schemas.microsoft.com/office/drawing/2014/main" xmlns="" id="{50E9A64D-4207-4980-8736-4201C3E0DC63}"/>
               </a:ext>
             </a:extLst>
           </p:cNvPr>
@@ -12491,7 +12491,7 @@
           <p:cNvPr id="3" name="標題 2">
             <a:extLst>
               <a:ext uri="{FF2B5EF4-FFF2-40B4-BE49-F238E27FC236}">
-                <a16:creationId xmlns="" xmlns:a16="http://schemas.microsoft.com/office/drawing/2014/main" id="{4ABAB1B2-9811-49A5-968D-AA6F881D5BFC}"/>
+                <a16:creationId xmlns:a16="http://schemas.microsoft.com/office/drawing/2014/main" xmlns="" id="{4ABAB1B2-9811-49A5-968D-AA6F881D5BFC}"/>
               </a:ext>
             </a:extLst>
           </p:cNvPr>
@@ -12572,7 +12572,7 @@
           <p:cNvPr id="4" name="內容版面配置區 3">
             <a:extLst>
               <a:ext uri="{FF2B5EF4-FFF2-40B4-BE49-F238E27FC236}">
-                <a16:creationId xmlns="" xmlns:a16="http://schemas.microsoft.com/office/drawing/2014/main" id="{FCCA5DD9-09D4-479C-9F96-62D1622C7DB1}"/>
+                <a16:creationId xmlns:a16="http://schemas.microsoft.com/office/drawing/2014/main" xmlns="" id="{FCCA5DD9-09D4-479C-9F96-62D1622C7DB1}"/>
               </a:ext>
             </a:extLst>
           </p:cNvPr>
@@ -12748,7 +12748,7 @@
           <p:cNvPr id="19" name="標題 1">
             <a:extLst>
               <a:ext uri="{FF2B5EF4-FFF2-40B4-BE49-F238E27FC236}">
-                <a16:creationId xmlns="" xmlns:a16="http://schemas.microsoft.com/office/drawing/2014/main" id="{50E9A64D-4207-4980-8736-4201C3E0DC63}"/>
+                <a16:creationId xmlns:a16="http://schemas.microsoft.com/office/drawing/2014/main" xmlns="" id="{50E9A64D-4207-4980-8736-4201C3E0DC63}"/>
               </a:ext>
             </a:extLst>
           </p:cNvPr>
@@ -12796,7 +12796,7 @@
           <p:cNvPr id="24" name="內容版面配置區 2">
             <a:extLst>
               <a:ext uri="{FF2B5EF4-FFF2-40B4-BE49-F238E27FC236}">
-                <a16:creationId xmlns="" xmlns:a16="http://schemas.microsoft.com/office/drawing/2014/main" id="{F5C22ADD-7A5D-44F8-969C-F4721C016703}"/>
+                <a16:creationId xmlns:a16="http://schemas.microsoft.com/office/drawing/2014/main" xmlns="" id="{F5C22ADD-7A5D-44F8-969C-F4721C016703}"/>
               </a:ext>
             </a:extLst>
           </p:cNvPr>
@@ -13068,7 +13068,7 @@
           <p:cNvPr id="20" name="內容版面配置區 2">
             <a:extLst>
               <a:ext uri="{FF2B5EF4-FFF2-40B4-BE49-F238E27FC236}">
-                <a16:creationId xmlns="" xmlns:a16="http://schemas.microsoft.com/office/drawing/2014/main" id="{2E881D55-3B47-403F-8F0E-EDFDE34A1B22}"/>
+                <a16:creationId xmlns:a16="http://schemas.microsoft.com/office/drawing/2014/main" xmlns="" id="{2E881D55-3B47-403F-8F0E-EDFDE34A1B22}"/>
               </a:ext>
             </a:extLst>
           </p:cNvPr>
@@ -13181,7 +13181,7 @@
           <p:cNvPr id="3" name="標題 2">
             <a:extLst>
               <a:ext uri="{FF2B5EF4-FFF2-40B4-BE49-F238E27FC236}">
-                <a16:creationId xmlns="" xmlns:a16="http://schemas.microsoft.com/office/drawing/2014/main" id="{4ABAB1B2-9811-49A5-968D-AA6F881D5BFC}"/>
+                <a16:creationId xmlns:a16="http://schemas.microsoft.com/office/drawing/2014/main" xmlns="" id="{4ABAB1B2-9811-49A5-968D-AA6F881D5BFC}"/>
               </a:ext>
             </a:extLst>
           </p:cNvPr>
@@ -13250,7 +13250,7 @@
           <p:cNvPr id="4" name="內容版面配置區 3">
             <a:extLst>
               <a:ext uri="{FF2B5EF4-FFF2-40B4-BE49-F238E27FC236}">
-                <a16:creationId xmlns="" xmlns:a16="http://schemas.microsoft.com/office/drawing/2014/main" id="{FCCA5DD9-09D4-479C-9F96-62D1622C7DB1}"/>
+                <a16:creationId xmlns:a16="http://schemas.microsoft.com/office/drawing/2014/main" xmlns="" id="{FCCA5DD9-09D4-479C-9F96-62D1622C7DB1}"/>
               </a:ext>
             </a:extLst>
           </p:cNvPr>
@@ -13447,7 +13447,7 @@
           <p:cNvPr id="19" name="標題 1">
             <a:extLst>
               <a:ext uri="{FF2B5EF4-FFF2-40B4-BE49-F238E27FC236}">
-                <a16:creationId xmlns="" xmlns:a16="http://schemas.microsoft.com/office/drawing/2014/main" id="{50E9A64D-4207-4980-8736-4201C3E0DC63}"/>
+                <a16:creationId xmlns:a16="http://schemas.microsoft.com/office/drawing/2014/main" xmlns="" id="{50E9A64D-4207-4980-8736-4201C3E0DC63}"/>
               </a:ext>
             </a:extLst>
           </p:cNvPr>
@@ -13487,7 +13487,7 @@
           <p:cNvPr id="24" name="內容版面配置區 2">
             <a:extLst>
               <a:ext uri="{FF2B5EF4-FFF2-40B4-BE49-F238E27FC236}">
-                <a16:creationId xmlns="" xmlns:a16="http://schemas.microsoft.com/office/drawing/2014/main" id="{F5C22ADD-7A5D-44F8-969C-F4721C016703}"/>
+                <a16:creationId xmlns:a16="http://schemas.microsoft.com/office/drawing/2014/main" xmlns="" id="{F5C22ADD-7A5D-44F8-969C-F4721C016703}"/>
               </a:ext>
             </a:extLst>
           </p:cNvPr>
@@ -13759,7 +13759,7 @@
           <p:cNvPr id="20" name="內容版面配置區 2">
             <a:extLst>
               <a:ext uri="{FF2B5EF4-FFF2-40B4-BE49-F238E27FC236}">
-                <a16:creationId xmlns="" xmlns:a16="http://schemas.microsoft.com/office/drawing/2014/main" id="{2E881D55-3B47-403F-8F0E-EDFDE34A1B22}"/>
+                <a16:creationId xmlns:a16="http://schemas.microsoft.com/office/drawing/2014/main" xmlns="" id="{2E881D55-3B47-403F-8F0E-EDFDE34A1B22}"/>
               </a:ext>
             </a:extLst>
           </p:cNvPr>
@@ -13872,7 +13872,7 @@
           <p:cNvPr id="4" name="標題 1">
             <a:extLst>
               <a:ext uri="{FF2B5EF4-FFF2-40B4-BE49-F238E27FC236}">
-                <a16:creationId xmlns="" xmlns:a16="http://schemas.microsoft.com/office/drawing/2014/main" id="{5E6B7CFB-F29E-40F1-941C-60839576EFD3}"/>
+                <a16:creationId xmlns:a16="http://schemas.microsoft.com/office/drawing/2014/main" xmlns="" id="{5E6B7CFB-F29E-40F1-941C-60839576EFD3}"/>
               </a:ext>
             </a:extLst>
           </p:cNvPr>
@@ -13938,7 +13938,7 @@
           <p:cNvPr id="5" name="內容版面配置區 2">
             <a:extLst>
               <a:ext uri="{FF2B5EF4-FFF2-40B4-BE49-F238E27FC236}">
-                <a16:creationId xmlns="" xmlns:a16="http://schemas.microsoft.com/office/drawing/2014/main" id="{A302D0AD-FC16-4984-8880-9A709EF0C7EB}"/>
+                <a16:creationId xmlns:a16="http://schemas.microsoft.com/office/drawing/2014/main" xmlns="" id="{A302D0AD-FC16-4984-8880-9A709EF0C7EB}"/>
               </a:ext>
             </a:extLst>
           </p:cNvPr>
@@ -14469,7 +14469,7 @@
           <p:cNvPr id="19" name="標題 1">
             <a:extLst>
               <a:ext uri="{FF2B5EF4-FFF2-40B4-BE49-F238E27FC236}">
-                <a16:creationId xmlns="" xmlns:a16="http://schemas.microsoft.com/office/drawing/2014/main" id="{50E9A64D-4207-4980-8736-4201C3E0DC63}"/>
+                <a16:creationId xmlns:a16="http://schemas.microsoft.com/office/drawing/2014/main" xmlns="" id="{50E9A64D-4207-4980-8736-4201C3E0DC63}"/>
               </a:ext>
             </a:extLst>
           </p:cNvPr>
@@ -14504,7 +14504,7 @@
           <p:cNvPr id="24" name="內容版面配置區 2">
             <a:extLst>
               <a:ext uri="{FF2B5EF4-FFF2-40B4-BE49-F238E27FC236}">
-                <a16:creationId xmlns="" xmlns:a16="http://schemas.microsoft.com/office/drawing/2014/main" id="{F5C22ADD-7A5D-44F8-969C-F4721C016703}"/>
+                <a16:creationId xmlns:a16="http://schemas.microsoft.com/office/drawing/2014/main" xmlns="" id="{F5C22ADD-7A5D-44F8-969C-F4721C016703}"/>
               </a:ext>
             </a:extLst>
           </p:cNvPr>
@@ -14961,7 +14961,7 @@
           <p:cNvPr id="7" name="標題 1">
             <a:extLst>
               <a:ext uri="{FF2B5EF4-FFF2-40B4-BE49-F238E27FC236}">
-                <a16:creationId xmlns="" xmlns:a16="http://schemas.microsoft.com/office/drawing/2014/main" id="{50E9A64D-4207-4980-8736-4201C3E0DC63}"/>
+                <a16:creationId xmlns:a16="http://schemas.microsoft.com/office/drawing/2014/main" xmlns="" id="{50E9A64D-4207-4980-8736-4201C3E0DC63}"/>
               </a:ext>
             </a:extLst>
           </p:cNvPr>
@@ -15073,7 +15073,7 @@
           <p:cNvPr id="3" name="標題 2">
             <a:extLst>
               <a:ext uri="{FF2B5EF4-FFF2-40B4-BE49-F238E27FC236}">
-                <a16:creationId xmlns="" xmlns:a16="http://schemas.microsoft.com/office/drawing/2014/main" id="{4ABAB1B2-9811-49A5-968D-AA6F881D5BFC}"/>
+                <a16:creationId xmlns:a16="http://schemas.microsoft.com/office/drawing/2014/main" xmlns="" id="{4ABAB1B2-9811-49A5-968D-AA6F881D5BFC}"/>
               </a:ext>
             </a:extLst>
           </p:cNvPr>
@@ -15130,7 +15130,7 @@
           <p:cNvPr id="4" name="內容版面配置區 3">
             <a:extLst>
               <a:ext uri="{FF2B5EF4-FFF2-40B4-BE49-F238E27FC236}">
-                <a16:creationId xmlns="" xmlns:a16="http://schemas.microsoft.com/office/drawing/2014/main" id="{FCCA5DD9-09D4-479C-9F96-62D1622C7DB1}"/>
+                <a16:creationId xmlns:a16="http://schemas.microsoft.com/office/drawing/2014/main" xmlns="" id="{FCCA5DD9-09D4-479C-9F96-62D1622C7DB1}"/>
               </a:ext>
             </a:extLst>
           </p:cNvPr>
@@ -15306,7 +15306,7 @@
           <p:cNvPr id="19" name="標題 1">
             <a:extLst>
               <a:ext uri="{FF2B5EF4-FFF2-40B4-BE49-F238E27FC236}">
-                <a16:creationId xmlns="" xmlns:a16="http://schemas.microsoft.com/office/drawing/2014/main" id="{50E9A64D-4207-4980-8736-4201C3E0DC63}"/>
+                <a16:creationId xmlns:a16="http://schemas.microsoft.com/office/drawing/2014/main" xmlns="" id="{50E9A64D-4207-4980-8736-4201C3E0DC63}"/>
               </a:ext>
             </a:extLst>
           </p:cNvPr>
@@ -15342,7 +15342,7 @@
           <p:cNvPr id="24" name="內容版面配置區 2">
             <a:extLst>
               <a:ext uri="{FF2B5EF4-FFF2-40B4-BE49-F238E27FC236}">
-                <a16:creationId xmlns="" xmlns:a16="http://schemas.microsoft.com/office/drawing/2014/main" id="{F5C22ADD-7A5D-44F8-969C-F4721C016703}"/>
+                <a16:creationId xmlns:a16="http://schemas.microsoft.com/office/drawing/2014/main" xmlns="" id="{F5C22ADD-7A5D-44F8-969C-F4721C016703}"/>
               </a:ext>
             </a:extLst>
           </p:cNvPr>
@@ -16758,7 +16758,7 @@
           <p:cNvPr id="19" name="標題 1">
             <a:extLst>
               <a:ext uri="{FF2B5EF4-FFF2-40B4-BE49-F238E27FC236}">
-                <a16:creationId xmlns="" xmlns:a16="http://schemas.microsoft.com/office/drawing/2014/main" id="{50E9A64D-4207-4980-8736-4201C3E0DC63}"/>
+                <a16:creationId xmlns:a16="http://schemas.microsoft.com/office/drawing/2014/main" xmlns="" id="{50E9A64D-4207-4980-8736-4201C3E0DC63}"/>
               </a:ext>
             </a:extLst>
           </p:cNvPr>
@@ -16797,7 +16797,7 @@
           <p:cNvPr id="24" name="內容版面配置區 2">
             <a:extLst>
               <a:ext uri="{FF2B5EF4-FFF2-40B4-BE49-F238E27FC236}">
-                <a16:creationId xmlns="" xmlns:a16="http://schemas.microsoft.com/office/drawing/2014/main" id="{F5C22ADD-7A5D-44F8-969C-F4721C016703}"/>
+                <a16:creationId xmlns:a16="http://schemas.microsoft.com/office/drawing/2014/main" xmlns="" id="{F5C22ADD-7A5D-44F8-969C-F4721C016703}"/>
               </a:ext>
             </a:extLst>
           </p:cNvPr>
@@ -17069,7 +17069,7 @@
           <p:cNvPr id="20" name="內容版面配置區 2">
             <a:extLst>
               <a:ext uri="{FF2B5EF4-FFF2-40B4-BE49-F238E27FC236}">
-                <a16:creationId xmlns="" xmlns:a16="http://schemas.microsoft.com/office/drawing/2014/main" id="{2E881D55-3B47-403F-8F0E-EDFDE34A1B22}"/>
+                <a16:creationId xmlns:a16="http://schemas.microsoft.com/office/drawing/2014/main" xmlns="" id="{2E881D55-3B47-403F-8F0E-EDFDE34A1B22}"/>
               </a:ext>
             </a:extLst>
           </p:cNvPr>
@@ -17287,7 +17287,7 @@
           <p:cNvPr id="3" name="標題 2">
             <a:extLst>
               <a:ext uri="{FF2B5EF4-FFF2-40B4-BE49-F238E27FC236}">
-                <a16:creationId xmlns="" xmlns:a16="http://schemas.microsoft.com/office/drawing/2014/main" id="{4ABAB1B2-9811-49A5-968D-AA6F881D5BFC}"/>
+                <a16:creationId xmlns:a16="http://schemas.microsoft.com/office/drawing/2014/main" xmlns="" id="{4ABAB1B2-9811-49A5-968D-AA6F881D5BFC}"/>
               </a:ext>
             </a:extLst>
           </p:cNvPr>
@@ -17356,7 +17356,7 @@
           <p:cNvPr id="4" name="內容版面配置區 3">
             <a:extLst>
               <a:ext uri="{FF2B5EF4-FFF2-40B4-BE49-F238E27FC236}">
-                <a16:creationId xmlns="" xmlns:a16="http://schemas.microsoft.com/office/drawing/2014/main" id="{FCCA5DD9-09D4-479C-9F96-62D1622C7DB1}"/>
+                <a16:creationId xmlns:a16="http://schemas.microsoft.com/office/drawing/2014/main" xmlns="" id="{FCCA5DD9-09D4-479C-9F96-62D1622C7DB1}"/>
               </a:ext>
             </a:extLst>
           </p:cNvPr>
@@ -17619,7 +17619,7 @@
           <p:cNvPr id="19" name="標題 1">
             <a:extLst>
               <a:ext uri="{FF2B5EF4-FFF2-40B4-BE49-F238E27FC236}">
-                <a16:creationId xmlns="" xmlns:a16="http://schemas.microsoft.com/office/drawing/2014/main" id="{50E9A64D-4207-4980-8736-4201C3E0DC63}"/>
+                <a16:creationId xmlns:a16="http://schemas.microsoft.com/office/drawing/2014/main" xmlns="" id="{50E9A64D-4207-4980-8736-4201C3E0DC63}"/>
               </a:ext>
             </a:extLst>
           </p:cNvPr>
@@ -17659,7 +17659,7 @@
           <p:cNvPr id="24" name="內容版面配置區 2">
             <a:extLst>
               <a:ext uri="{FF2B5EF4-FFF2-40B4-BE49-F238E27FC236}">
-                <a16:creationId xmlns="" xmlns:a16="http://schemas.microsoft.com/office/drawing/2014/main" id="{F5C22ADD-7A5D-44F8-969C-F4721C016703}"/>
+                <a16:creationId xmlns:a16="http://schemas.microsoft.com/office/drawing/2014/main" xmlns="" id="{F5C22ADD-7A5D-44F8-969C-F4721C016703}"/>
               </a:ext>
             </a:extLst>
           </p:cNvPr>
@@ -19073,7 +19073,7 @@
           <p:cNvPr id="3" name="標題 2">
             <a:extLst>
               <a:ext uri="{FF2B5EF4-FFF2-40B4-BE49-F238E27FC236}">
-                <a16:creationId xmlns="" xmlns:a16="http://schemas.microsoft.com/office/drawing/2014/main" id="{4ABAB1B2-9811-49A5-968D-AA6F881D5BFC}"/>
+                <a16:creationId xmlns:a16="http://schemas.microsoft.com/office/drawing/2014/main" xmlns="" id="{4ABAB1B2-9811-49A5-968D-AA6F881D5BFC}"/>
               </a:ext>
             </a:extLst>
           </p:cNvPr>
@@ -19190,7 +19190,7 @@
           <p:cNvPr id="5" name="內容版面配置區 3">
             <a:extLst>
               <a:ext uri="{FF2B5EF4-FFF2-40B4-BE49-F238E27FC236}">
-                <a16:creationId xmlns="" xmlns:a16="http://schemas.microsoft.com/office/drawing/2014/main" id="{FCCA5DD9-09D4-479C-9F96-62D1622C7DB1}"/>
+                <a16:creationId xmlns:a16="http://schemas.microsoft.com/office/drawing/2014/main" xmlns="" id="{FCCA5DD9-09D4-479C-9F96-62D1622C7DB1}"/>
               </a:ext>
             </a:extLst>
           </p:cNvPr>
@@ -19630,7 +19630,7 @@
           <p:cNvPr id="19" name="標題 1">
             <a:extLst>
               <a:ext uri="{FF2B5EF4-FFF2-40B4-BE49-F238E27FC236}">
-                <a16:creationId xmlns="" xmlns:a16="http://schemas.microsoft.com/office/drawing/2014/main" id="{50E9A64D-4207-4980-8736-4201C3E0DC63}"/>
+                <a16:creationId xmlns:a16="http://schemas.microsoft.com/office/drawing/2014/main" xmlns="" id="{50E9A64D-4207-4980-8736-4201C3E0DC63}"/>
               </a:ext>
             </a:extLst>
           </p:cNvPr>
@@ -19706,7 +19706,7 @@
           <p:cNvPr id="24" name="內容版面配置區 2">
             <a:extLst>
               <a:ext uri="{FF2B5EF4-FFF2-40B4-BE49-F238E27FC236}">
-                <a16:creationId xmlns="" xmlns:a16="http://schemas.microsoft.com/office/drawing/2014/main" id="{F5C22ADD-7A5D-44F8-969C-F4721C016703}"/>
+                <a16:creationId xmlns:a16="http://schemas.microsoft.com/office/drawing/2014/main" xmlns="" id="{F5C22ADD-7A5D-44F8-969C-F4721C016703}"/>
               </a:ext>
             </a:extLst>
           </p:cNvPr>
@@ -20065,14 +20065,14 @@
           </a:p>
         </p:txBody>
       </p:sp>
-      <mc:AlternateContent xmlns:mc="http://schemas.openxmlformats.org/markup-compatibility/2006" xmlns:a14="http://schemas.microsoft.com/office/drawing/2010/main">
-        <mc:Choice Requires="a14">
+      <mc:AlternateContent xmlns:mc="http://schemas.openxmlformats.org/markup-compatibility/2006">
+        <mc:Choice xmlns:a14="http://schemas.microsoft.com/office/drawing/2010/main" Requires="a14">
           <p:sp>
             <p:nvSpPr>
               <p:cNvPr id="20" name="內容版面配置區 2">
                 <a:extLst>
                   <a:ext uri="{FF2B5EF4-FFF2-40B4-BE49-F238E27FC236}">
-                    <a16:creationId xmlns="" xmlns:a16="http://schemas.microsoft.com/office/drawing/2014/main" id="{2E881D55-3B47-403F-8F0E-EDFDE34A1B22}"/>
+                    <a16:creationId xmlns:a16="http://schemas.microsoft.com/office/drawing/2014/main" xmlns="" id="{2E881D55-3B47-403F-8F0E-EDFDE34A1B22}"/>
                   </a:ext>
                 </a:extLst>
               </p:cNvPr>
@@ -20086,7 +20086,7 @@
             <p:spPr>
               <a:xfrm>
                 <a:off x="192197" y="1700808"/>
-                <a:ext cx="11590847" cy="4384009"/>
+                <a:ext cx="11590847" cy="4824536"/>
               </a:xfrm>
             </p:spPr>
             <p:txBody>
@@ -20562,16 +20562,33 @@
                   <a:t>：</a:t>
                 </a:r>
                 <a:r>
+                  <a:rPr lang="zh-TW" altLang="zh-TW" sz="2400" dirty="0" smtClean="0"/>
+                  <a:t>為</a:t>
+                </a:r>
+                <a:r>
                   <a:rPr lang="zh-TW" altLang="zh-TW" sz="2400" dirty="0"/>
-                  <a:t>為一隨機的</a:t>
+                  <a:t>一隨機的</a:t>
                 </a:r>
                 <a:r>
                   <a:rPr lang="en-US" altLang="zh-TW" sz="2400" dirty="0" smtClean="0"/>
                   <a:t>3-coloring</a:t>
                 </a:r>
+              </a:p>
+              <a:p>
+                <a:pPr marL="274320" lvl="1" indent="-274320" algn="just">
+                  <a:lnSpc>
+                    <a:spcPct val="150000"/>
+                  </a:lnSpc>
+                  <a:spcBef>
+                    <a:spcPts val="1800"/>
+                  </a:spcBef>
+                  <a:buSzPct val="80000"/>
+                  <a:buFont typeface="Wingdings" panose="05000000000000000000" pitchFamily="2" charset="2"/>
+                  <a:buChar char="Ø"/>
+                </a:pPr>
                 <a:r>
-                  <a:rPr lang="zh-TW" altLang="en-US" sz="2400" dirty="0"/>
-                  <a:t>，</a:t>
+                  <a:rPr lang="zh-TW" altLang="en-US" sz="2400" dirty="0" smtClean="0"/>
+                  <a:t> </a:t>
                 </a:r>
                 <a:r>
                   <a:rPr lang="zh-TW" altLang="zh-TW" sz="2400" dirty="0" smtClean="0"/>
@@ -20680,13 +20697,13 @@
             </p:txBody>
           </p:sp>
         </mc:Choice>
-        <mc:Fallback xmlns="">
+        <mc:Fallback>
           <p:sp>
             <p:nvSpPr>
               <p:cNvPr id="20" name="內容版面配置區 2">
                 <a:extLst>
                   <a:ext uri="{FF2B5EF4-FFF2-40B4-BE49-F238E27FC236}">
-                    <a16:creationId xmlns="" xmlns:a16="http://schemas.microsoft.com/office/drawing/2014/main" id="{2E881D55-3B47-403F-8F0E-EDFDE34A1B22}"/>
+                    <a16:creationId xmlns:a16="http://schemas.microsoft.com/office/drawing/2014/main" xmlns="" xmlns:a14="http://schemas.microsoft.com/office/drawing/2010/main" id="{2E881D55-3B47-403F-8F0E-EDFDE34A1B22}"/>
                   </a:ext>
                 </a:extLst>
               </p:cNvPr>
@@ -20700,12 +20717,12 @@
             <p:spPr>
               <a:xfrm>
                 <a:off x="192197" y="1700808"/>
-                <a:ext cx="11590847" cy="4384009"/>
+                <a:ext cx="11590847" cy="4824536"/>
               </a:xfrm>
               <a:blipFill rotWithShape="1">
                 <a:blip r:embed="rId3"/>
                 <a:stretch>
-                  <a:fillRect l="-421" r="-3419"/>
+                  <a:fillRect l="-421" r="-684"/>
                 </a:stretch>
               </a:blipFill>
             </p:spPr>
@@ -20724,6 +20741,60 @@
           </p:sp>
         </mc:Fallback>
       </mc:AlternateContent>
+      <p:pic>
+        <p:nvPicPr>
+          <p:cNvPr id="1026" name="Picture 2"/>
+          <p:cNvPicPr>
+            <a:picLocks noChangeAspect="1" noChangeArrowheads="1"/>
+          </p:cNvPicPr>
+          <p:nvPr/>
+        </p:nvPicPr>
+        <p:blipFill>
+          <a:blip r:embed="rId4">
+            <a:extLst>
+              <a:ext uri="{28A0092B-C50C-407E-A947-70E740481C1C}">
+                <a14:useLocalDpi xmlns:a14="http://schemas.microsoft.com/office/drawing/2010/main" val="0"/>
+              </a:ext>
+            </a:extLst>
+          </a:blip>
+          <a:srcRect/>
+          <a:stretch>
+            <a:fillRect/>
+          </a:stretch>
+        </p:blipFill>
+        <p:spPr bwMode="auto">
+          <a:xfrm>
+            <a:off x="6509838" y="2806386"/>
+            <a:ext cx="5690333" cy="2710846"/>
+          </a:xfrm>
+          <a:prstGeom prst="rect">
+            <a:avLst/>
+          </a:prstGeom>
+          <a:noFill/>
+          <a:ln>
+            <a:noFill/>
+          </a:ln>
+          <a:extLst>
+            <a:ext uri="{909E8E84-426E-40DD-AFC4-6F175D3DCCD1}">
+              <a14:hiddenFill xmlns:a14="http://schemas.microsoft.com/office/drawing/2010/main">
+                <a:solidFill>
+                  <a:schemeClr val="accent1"/>
+                </a:solidFill>
+              </a14:hiddenFill>
+            </a:ext>
+            <a:ext uri="{91240B29-F687-4F45-9708-019B960494DF}">
+              <a14:hiddenLine xmlns:a14="http://schemas.microsoft.com/office/drawing/2010/main" w="9525">
+                <a:solidFill>
+                  <a:schemeClr val="tx1"/>
+                </a:solidFill>
+                <a:miter lim="800000"/>
+                <a:headEnd/>
+                <a:tailEnd/>
+              </a14:hiddenLine>
+            </a:ext>
+          </a:extLst>
+        </p:spPr>
+      </p:pic>
     </p:spTree>
     <p:extLst>
       <p:ext uri="{BB962C8B-B14F-4D97-AF65-F5344CB8AC3E}">
@@ -21092,7 +21163,7 @@
   <a:extraClrSchemeLst/>
   <a:extLst>
     <a:ext uri="{05A4C25C-085E-4340-85A3-A5531E510DB2}">
-      <thm15:themeFamily xmlns="" xmlns:thm15="http://schemas.microsoft.com/office/thememl/2012/main" name="Office_26713188_TF03460544" id="{6F554B24-2C09-4153-BF01-57653ED04444}" vid="{C80FED5E-EC00-4C61-90A9-0EA5EF995274}"/>
+      <thm15:themeFamily xmlns:thm15="http://schemas.microsoft.com/office/thememl/2012/main" xmlns="" name="Office_26713188_TF03460544" id="{6F554B24-2C09-4153-BF01-57653ED04444}" vid="{C80FED5E-EC00-4C61-90A9-0EA5EF995274}"/>
     </a:ext>
   </a:extLst>
 </a:theme>

</xml_diff>